<commit_message>
algorithm and risk level update
</commit_message>
<xml_diff>
--- a/SystematicReview/MRONJ機率圖表.pptx
+++ b/SystematicReview/MRONJ機率圖表.pptx
@@ -6,6 +6,7 @@
   </p:sldMasterIdLst>
   <p:sldIdLst>
     <p:sldId id="257" r:id="rId2"/>
+    <p:sldId id="258" r:id="rId3"/>
   </p:sldIdLst>
   <p:sldSz cx="10799763" cy="10799763"/>
   <p:notesSz cx="6858000" cy="9144000"/>
@@ -113,6 +114,7 @@
         <p14:section name="口外" id="{2824C6D8-A29F-400E-BAE9-264FC38604E4}">
           <p14:sldIdLst>
             <p14:sldId id="257"/>
+            <p14:sldId id="258"/>
           </p14:sldIdLst>
         </p14:section>
       </p14:sectionLst>
@@ -255,7 +257,7 @@
           <a:p>
             <a:fld id="{1DC494D7-C2CE-4BC1-BB35-708CE6A3F80B}" type="datetimeFigureOut">
               <a:rPr lang="zh-TW" altLang="en-US" smtClean="0"/>
-              <a:t>2025/8/21</a:t>
+              <a:t>2025/9/16</a:t>
             </a:fld>
             <a:endParaRPr lang="zh-TW" altLang="en-US"/>
           </a:p>
@@ -425,7 +427,7 @@
           <a:p>
             <a:fld id="{1DC494D7-C2CE-4BC1-BB35-708CE6A3F80B}" type="datetimeFigureOut">
               <a:rPr lang="zh-TW" altLang="en-US" smtClean="0"/>
-              <a:t>2025/8/21</a:t>
+              <a:t>2025/9/16</a:t>
             </a:fld>
             <a:endParaRPr lang="zh-TW" altLang="en-US"/>
           </a:p>
@@ -605,7 +607,7 @@
           <a:p>
             <a:fld id="{1DC494D7-C2CE-4BC1-BB35-708CE6A3F80B}" type="datetimeFigureOut">
               <a:rPr lang="zh-TW" altLang="en-US" smtClean="0"/>
-              <a:t>2025/8/21</a:t>
+              <a:t>2025/9/16</a:t>
             </a:fld>
             <a:endParaRPr lang="zh-TW" altLang="en-US"/>
           </a:p>
@@ -775,7 +777,7 @@
           <a:p>
             <a:fld id="{1DC494D7-C2CE-4BC1-BB35-708CE6A3F80B}" type="datetimeFigureOut">
               <a:rPr lang="zh-TW" altLang="en-US" smtClean="0"/>
-              <a:t>2025/8/21</a:t>
+              <a:t>2025/9/16</a:t>
             </a:fld>
             <a:endParaRPr lang="zh-TW" altLang="en-US"/>
           </a:p>
@@ -1021,7 +1023,7 @@
           <a:p>
             <a:fld id="{1DC494D7-C2CE-4BC1-BB35-708CE6A3F80B}" type="datetimeFigureOut">
               <a:rPr lang="zh-TW" altLang="en-US" smtClean="0"/>
-              <a:t>2025/8/21</a:t>
+              <a:t>2025/9/16</a:t>
             </a:fld>
             <a:endParaRPr lang="zh-TW" altLang="en-US"/>
           </a:p>
@@ -1253,7 +1255,7 @@
           <a:p>
             <a:fld id="{1DC494D7-C2CE-4BC1-BB35-708CE6A3F80B}" type="datetimeFigureOut">
               <a:rPr lang="zh-TW" altLang="en-US" smtClean="0"/>
-              <a:t>2025/8/21</a:t>
+              <a:t>2025/9/16</a:t>
             </a:fld>
             <a:endParaRPr lang="zh-TW" altLang="en-US"/>
           </a:p>
@@ -1620,7 +1622,7 @@
           <a:p>
             <a:fld id="{1DC494D7-C2CE-4BC1-BB35-708CE6A3F80B}" type="datetimeFigureOut">
               <a:rPr lang="zh-TW" altLang="en-US" smtClean="0"/>
-              <a:t>2025/8/21</a:t>
+              <a:t>2025/9/16</a:t>
             </a:fld>
             <a:endParaRPr lang="zh-TW" altLang="en-US"/>
           </a:p>
@@ -1738,7 +1740,7 @@
           <a:p>
             <a:fld id="{1DC494D7-C2CE-4BC1-BB35-708CE6A3F80B}" type="datetimeFigureOut">
               <a:rPr lang="zh-TW" altLang="en-US" smtClean="0"/>
-              <a:t>2025/8/21</a:t>
+              <a:t>2025/9/16</a:t>
             </a:fld>
             <a:endParaRPr lang="zh-TW" altLang="en-US"/>
           </a:p>
@@ -1833,7 +1835,7 @@
           <a:p>
             <a:fld id="{1DC494D7-C2CE-4BC1-BB35-708CE6A3F80B}" type="datetimeFigureOut">
               <a:rPr lang="zh-TW" altLang="en-US" smtClean="0"/>
-              <a:t>2025/8/21</a:t>
+              <a:t>2025/9/16</a:t>
             </a:fld>
             <a:endParaRPr lang="zh-TW" altLang="en-US"/>
           </a:p>
@@ -2110,7 +2112,7 @@
           <a:p>
             <a:fld id="{1DC494D7-C2CE-4BC1-BB35-708CE6A3F80B}" type="datetimeFigureOut">
               <a:rPr lang="zh-TW" altLang="en-US" smtClean="0"/>
-              <a:t>2025/8/21</a:t>
+              <a:t>2025/9/16</a:t>
             </a:fld>
             <a:endParaRPr lang="zh-TW" altLang="en-US"/>
           </a:p>
@@ -2367,7 +2369,7 @@
           <a:p>
             <a:fld id="{1DC494D7-C2CE-4BC1-BB35-708CE6A3F80B}" type="datetimeFigureOut">
               <a:rPr lang="zh-TW" altLang="en-US" smtClean="0"/>
-              <a:t>2025/8/21</a:t>
+              <a:t>2025/9/16</a:t>
             </a:fld>
             <a:endParaRPr lang="zh-TW" altLang="en-US"/>
           </a:p>
@@ -2580,7 +2582,7 @@
           <a:p>
             <a:fld id="{1DC494D7-C2CE-4BC1-BB35-708CE6A3F80B}" type="datetimeFigureOut">
               <a:rPr lang="zh-TW" altLang="en-US" smtClean="0"/>
-              <a:t>2025/8/21</a:t>
+              <a:t>2025/9/16</a:t>
             </a:fld>
             <a:endParaRPr lang="zh-TW" altLang="en-US"/>
           </a:p>
@@ -6369,6 +6371,3734 @@
     <p:extLst>
       <p:ext uri="{BB962C8B-B14F-4D97-AF65-F5344CB8AC3E}">
         <p14:creationId xmlns:p14="http://schemas.microsoft.com/office/powerpoint/2010/main" val="2343355836"/>
+      </p:ext>
+    </p:extLst>
+  </p:cSld>
+  <p:clrMapOvr>
+    <a:masterClrMapping/>
+  </p:clrMapOvr>
+</p:sld>
+</file>
+
+<file path=ppt/slides/slide2.xml><?xml version="1.0" encoding="utf-8"?>
+<p:sld xmlns:a="http://schemas.openxmlformats.org/drawingml/2006/main" xmlns:r="http://schemas.openxmlformats.org/officeDocument/2006/relationships" xmlns:p="http://schemas.openxmlformats.org/presentationml/2006/main">
+  <p:cSld>
+    <p:spTree>
+      <p:nvGrpSpPr>
+        <p:cNvPr id="1" name="">
+          <a:extLst>
+            <a:ext uri="{FF2B5EF4-FFF2-40B4-BE49-F238E27FC236}">
+              <a16:creationId xmlns:a16="http://schemas.microsoft.com/office/drawing/2014/main" id="{36BC80BB-EC50-1B25-1D41-E444A6780BFF}"/>
+            </a:ext>
+          </a:extLst>
+        </p:cNvPr>
+        <p:cNvGrpSpPr/>
+        <p:nvPr/>
+      </p:nvGrpSpPr>
+      <p:grpSpPr>
+        <a:xfrm>
+          <a:off x="0" y="0"/>
+          <a:ext cx="0" cy="0"/>
+          <a:chOff x="0" y="0"/>
+          <a:chExt cx="0" cy="0"/>
+        </a:xfrm>
+      </p:grpSpPr>
+      <p:sp>
+        <p:nvSpPr>
+          <p:cNvPr id="2" name="TextBox 1">
+            <a:extLst>
+              <a:ext uri="{FF2B5EF4-FFF2-40B4-BE49-F238E27FC236}">
+                <a16:creationId xmlns:a16="http://schemas.microsoft.com/office/drawing/2014/main" id="{16A8574B-A8AE-F14A-EC95-39EA4E47B5B9}"/>
+              </a:ext>
+            </a:extLst>
+          </p:cNvPr>
+          <p:cNvSpPr txBox="1"/>
+          <p:nvPr/>
+        </p:nvSpPr>
+        <p:spPr>
+          <a:xfrm>
+            <a:off x="61445" y="4001223"/>
+            <a:ext cx="1640748" cy="830997"/>
+          </a:xfrm>
+          <a:prstGeom prst="rect">
+            <a:avLst/>
+          </a:prstGeom>
+          <a:noFill/>
+          <a:ln w="57150">
+            <a:solidFill>
+              <a:schemeClr val="tx1">
+                <a:lumMod val="95000"/>
+                <a:lumOff val="5000"/>
+              </a:schemeClr>
+            </a:solidFill>
+          </a:ln>
+        </p:spPr>
+        <p:txBody>
+          <a:bodyPr wrap="square" rtlCol="0">
+            <a:spAutoFit/>
+          </a:bodyPr>
+          <a:lstStyle/>
+          <a:p>
+            <a:r>
+              <a:rPr lang="en-US" altLang="zh-TW" sz="2400" b="1" dirty="0">
+                <a:latin typeface="微軟正黑體" panose="020B0604030504040204" pitchFamily="34" charset="-120"/>
+                <a:ea typeface="微軟正黑體" panose="020B0604030504040204" pitchFamily="34" charset="-120"/>
+              </a:rPr>
+              <a:t>MRONJ</a:t>
+            </a:r>
+          </a:p>
+          <a:p>
+            <a:r>
+              <a:rPr lang="en-US" altLang="zh-TW" sz="2400" b="1" dirty="0">
+                <a:latin typeface="微軟正黑體" panose="020B0604030504040204" pitchFamily="34" charset="-120"/>
+                <a:ea typeface="微軟正黑體" panose="020B0604030504040204" pitchFamily="34" charset="-120"/>
+              </a:rPr>
+              <a:t>Incidence</a:t>
+            </a:r>
+            <a:endParaRPr lang="zh-TW" altLang="en-US" sz="2400" b="1" dirty="0">
+              <a:latin typeface="微軟正黑體" panose="020B0604030504040204" pitchFamily="34" charset="-120"/>
+              <a:ea typeface="微軟正黑體" panose="020B0604030504040204" pitchFamily="34" charset="-120"/>
+            </a:endParaRPr>
+          </a:p>
+        </p:txBody>
+      </p:sp>
+      <p:sp>
+        <p:nvSpPr>
+          <p:cNvPr id="5" name="TextBox 4">
+            <a:extLst>
+              <a:ext uri="{FF2B5EF4-FFF2-40B4-BE49-F238E27FC236}">
+                <a16:creationId xmlns:a16="http://schemas.microsoft.com/office/drawing/2014/main" id="{91C0C73D-0492-3325-4114-52984FE7D77D}"/>
+              </a:ext>
+            </a:extLst>
+          </p:cNvPr>
+          <p:cNvSpPr txBox="1"/>
+          <p:nvPr/>
+        </p:nvSpPr>
+        <p:spPr>
+          <a:xfrm>
+            <a:off x="1965833" y="960427"/>
+            <a:ext cx="1163929" cy="707886"/>
+          </a:xfrm>
+          <a:prstGeom prst="rect">
+            <a:avLst/>
+          </a:prstGeom>
+          <a:noFill/>
+          <a:ln w="38100">
+            <a:solidFill>
+              <a:schemeClr val="tx1">
+                <a:lumMod val="95000"/>
+                <a:lumOff val="5000"/>
+              </a:schemeClr>
+            </a:solidFill>
+          </a:ln>
+        </p:spPr>
+        <p:txBody>
+          <a:bodyPr wrap="square" rtlCol="0">
+            <a:spAutoFit/>
+          </a:bodyPr>
+          <a:lstStyle/>
+          <a:p>
+            <a:r>
+              <a:rPr lang="en-US" altLang="zh-TW" sz="2000" b="1" dirty="0">
+                <a:latin typeface="微軟正黑體" panose="020B0604030504040204" pitchFamily="34" charset="-120"/>
+                <a:ea typeface="微軟正黑體" panose="020B0604030504040204" pitchFamily="34" charset="-120"/>
+              </a:rPr>
+              <a:t>Osteo-</a:t>
+            </a:r>
+          </a:p>
+          <a:p>
+            <a:r>
+              <a:rPr lang="en-US" altLang="zh-TW" sz="2000" b="1" dirty="0">
+                <a:latin typeface="微軟正黑體" panose="020B0604030504040204" pitchFamily="34" charset="-120"/>
+                <a:ea typeface="微軟正黑體" panose="020B0604030504040204" pitchFamily="34" charset="-120"/>
+              </a:rPr>
+              <a:t>porosis</a:t>
+            </a:r>
+            <a:endParaRPr lang="zh-TW" altLang="en-US" sz="2000" b="1" dirty="0">
+              <a:latin typeface="微軟正黑體" panose="020B0604030504040204" pitchFamily="34" charset="-120"/>
+              <a:ea typeface="微軟正黑體" panose="020B0604030504040204" pitchFamily="34" charset="-120"/>
+            </a:endParaRPr>
+          </a:p>
+        </p:txBody>
+      </p:sp>
+      <p:sp>
+        <p:nvSpPr>
+          <p:cNvPr id="6" name="TextBox 5">
+            <a:extLst>
+              <a:ext uri="{FF2B5EF4-FFF2-40B4-BE49-F238E27FC236}">
+                <a16:creationId xmlns:a16="http://schemas.microsoft.com/office/drawing/2014/main" id="{DFDCA640-5FA5-3BD5-C04E-368DCFCBA477}"/>
+              </a:ext>
+            </a:extLst>
+          </p:cNvPr>
+          <p:cNvSpPr txBox="1"/>
+          <p:nvPr/>
+        </p:nvSpPr>
+        <p:spPr>
+          <a:xfrm>
+            <a:off x="1951273" y="7307360"/>
+            <a:ext cx="1138459" cy="400110"/>
+          </a:xfrm>
+          <a:prstGeom prst="rect">
+            <a:avLst/>
+          </a:prstGeom>
+          <a:noFill/>
+          <a:ln w="38100">
+            <a:solidFill>
+              <a:schemeClr val="tx1">
+                <a:lumMod val="95000"/>
+                <a:lumOff val="5000"/>
+              </a:schemeClr>
+            </a:solidFill>
+          </a:ln>
+        </p:spPr>
+        <p:txBody>
+          <a:bodyPr wrap="square" rtlCol="0">
+            <a:spAutoFit/>
+          </a:bodyPr>
+          <a:lstStyle/>
+          <a:p>
+            <a:r>
+              <a:rPr lang="en-US" altLang="zh-TW" sz="2000" b="1" dirty="0">
+                <a:latin typeface="微軟正黑體" panose="020B0604030504040204" pitchFamily="34" charset="-120"/>
+                <a:ea typeface="微軟正黑體" panose="020B0604030504040204" pitchFamily="34" charset="-120"/>
+              </a:rPr>
+              <a:t>Cancer</a:t>
+            </a:r>
+            <a:endParaRPr lang="zh-TW" altLang="en-US" sz="2000" b="1" dirty="0">
+              <a:latin typeface="微軟正黑體" panose="020B0604030504040204" pitchFamily="34" charset="-120"/>
+              <a:ea typeface="微軟正黑體" panose="020B0604030504040204" pitchFamily="34" charset="-120"/>
+            </a:endParaRPr>
+          </a:p>
+        </p:txBody>
+      </p:sp>
+      <p:sp>
+        <p:nvSpPr>
+          <p:cNvPr id="13" name="TextBox 12">
+            <a:extLst>
+              <a:ext uri="{FF2B5EF4-FFF2-40B4-BE49-F238E27FC236}">
+                <a16:creationId xmlns:a16="http://schemas.microsoft.com/office/drawing/2014/main" id="{C1347178-EE0C-7713-1D8E-C95FF561FC12}"/>
+              </a:ext>
+            </a:extLst>
+          </p:cNvPr>
+          <p:cNvSpPr txBox="1"/>
+          <p:nvPr/>
+        </p:nvSpPr>
+        <p:spPr>
+          <a:xfrm>
+            <a:off x="4010141" y="2455778"/>
+            <a:ext cx="1808974" cy="338554"/>
+          </a:xfrm>
+          <a:prstGeom prst="rect">
+            <a:avLst/>
+          </a:prstGeom>
+          <a:noFill/>
+          <a:ln w="28575">
+            <a:solidFill>
+              <a:schemeClr val="tx1">
+                <a:lumMod val="95000"/>
+                <a:lumOff val="5000"/>
+              </a:schemeClr>
+            </a:solidFill>
+          </a:ln>
+        </p:spPr>
+        <p:txBody>
+          <a:bodyPr wrap="square" rtlCol="0">
+            <a:spAutoFit/>
+          </a:bodyPr>
+          <a:lstStyle/>
+          <a:p>
+            <a:r>
+              <a:rPr lang="en-US" altLang="zh-TW" sz="1600" b="1" dirty="0">
+                <a:latin typeface="微軟正黑體" panose="020B0604030504040204" pitchFamily="34" charset="-120"/>
+                <a:ea typeface="微軟正黑體" panose="020B0604030504040204" pitchFamily="34" charset="-120"/>
+              </a:rPr>
+              <a:t>Bisphosphonate</a:t>
+            </a:r>
+            <a:endParaRPr lang="zh-TW" altLang="en-US" sz="1600" b="1" dirty="0">
+              <a:latin typeface="微軟正黑體" panose="020B0604030504040204" pitchFamily="34" charset="-120"/>
+              <a:ea typeface="微軟正黑體" panose="020B0604030504040204" pitchFamily="34" charset="-120"/>
+            </a:endParaRPr>
+          </a:p>
+        </p:txBody>
+      </p:sp>
+      <p:sp>
+        <p:nvSpPr>
+          <p:cNvPr id="14" name="TextBox 13">
+            <a:extLst>
+              <a:ext uri="{FF2B5EF4-FFF2-40B4-BE49-F238E27FC236}">
+                <a16:creationId xmlns:a16="http://schemas.microsoft.com/office/drawing/2014/main" id="{5EFA6557-7FAB-183D-E27A-AB6124608B6A}"/>
+              </a:ext>
+            </a:extLst>
+          </p:cNvPr>
+          <p:cNvSpPr txBox="1"/>
+          <p:nvPr/>
+        </p:nvSpPr>
+        <p:spPr>
+          <a:xfrm>
+            <a:off x="4031120" y="4779376"/>
+            <a:ext cx="1386600" cy="338554"/>
+          </a:xfrm>
+          <a:prstGeom prst="rect">
+            <a:avLst/>
+          </a:prstGeom>
+          <a:noFill/>
+          <a:ln w="28575">
+            <a:solidFill>
+              <a:schemeClr val="tx1">
+                <a:lumMod val="95000"/>
+                <a:lumOff val="5000"/>
+              </a:schemeClr>
+            </a:solidFill>
+          </a:ln>
+        </p:spPr>
+        <p:txBody>
+          <a:bodyPr wrap="square" rtlCol="0">
+            <a:spAutoFit/>
+          </a:bodyPr>
+          <a:lstStyle/>
+          <a:p>
+            <a:r>
+              <a:rPr lang="en-US" altLang="zh-TW" sz="1600" b="1" dirty="0">
+                <a:latin typeface="微軟正黑體" panose="020B0604030504040204" pitchFamily="34" charset="-120"/>
+                <a:ea typeface="微軟正黑體" panose="020B0604030504040204" pitchFamily="34" charset="-120"/>
+              </a:rPr>
+              <a:t>Denosumab</a:t>
+            </a:r>
+            <a:endParaRPr lang="zh-TW" altLang="en-US" sz="1600" b="1" dirty="0">
+              <a:latin typeface="微軟正黑體" panose="020B0604030504040204" pitchFamily="34" charset="-120"/>
+              <a:ea typeface="微軟正黑體" panose="020B0604030504040204" pitchFamily="34" charset="-120"/>
+            </a:endParaRPr>
+          </a:p>
+        </p:txBody>
+      </p:sp>
+      <p:sp>
+        <p:nvSpPr>
+          <p:cNvPr id="18" name="TextBox 17">
+            <a:extLst>
+              <a:ext uri="{FF2B5EF4-FFF2-40B4-BE49-F238E27FC236}">
+                <a16:creationId xmlns:a16="http://schemas.microsoft.com/office/drawing/2014/main" id="{B5B3A6BD-911D-A9EF-2616-4AA3C637F147}"/>
+              </a:ext>
+            </a:extLst>
+          </p:cNvPr>
+          <p:cNvSpPr txBox="1"/>
+          <p:nvPr/>
+        </p:nvSpPr>
+        <p:spPr>
+          <a:xfrm>
+            <a:off x="3498731" y="591095"/>
+            <a:ext cx="1871840" cy="369332"/>
+          </a:xfrm>
+          <a:prstGeom prst="rect">
+            <a:avLst/>
+          </a:prstGeom>
+          <a:noFill/>
+          <a:ln w="28575">
+            <a:solidFill>
+              <a:schemeClr val="tx1">
+                <a:lumMod val="95000"/>
+                <a:lumOff val="5000"/>
+              </a:schemeClr>
+            </a:solidFill>
+          </a:ln>
+        </p:spPr>
+        <p:txBody>
+          <a:bodyPr wrap="square" rtlCol="0">
+            <a:spAutoFit/>
+          </a:bodyPr>
+          <a:lstStyle/>
+          <a:p>
+            <a:r>
+              <a:rPr lang="en-US" altLang="zh-TW" b="1" dirty="0">
+                <a:latin typeface="微軟正黑體" panose="020B0604030504040204" pitchFamily="34" charset="-120"/>
+                <a:ea typeface="微軟正黑體" panose="020B0604030504040204" pitchFamily="34" charset="-120"/>
+              </a:rPr>
+              <a:t>No Medication</a:t>
+            </a:r>
+            <a:endParaRPr lang="zh-TW" altLang="en-US" b="1" dirty="0">
+              <a:latin typeface="微軟正黑體" panose="020B0604030504040204" pitchFamily="34" charset="-120"/>
+              <a:ea typeface="微軟正黑體" panose="020B0604030504040204" pitchFamily="34" charset="-120"/>
+            </a:endParaRPr>
+          </a:p>
+        </p:txBody>
+      </p:sp>
+      <p:sp>
+        <p:nvSpPr>
+          <p:cNvPr id="19" name="TextBox 18">
+            <a:extLst>
+              <a:ext uri="{FF2B5EF4-FFF2-40B4-BE49-F238E27FC236}">
+                <a16:creationId xmlns:a16="http://schemas.microsoft.com/office/drawing/2014/main" id="{81426C22-706B-1E26-8CA2-DFD6FD37B5CE}"/>
+              </a:ext>
+            </a:extLst>
+          </p:cNvPr>
+          <p:cNvSpPr txBox="1"/>
+          <p:nvPr/>
+        </p:nvSpPr>
+        <p:spPr>
+          <a:xfrm>
+            <a:off x="3507982" y="1579480"/>
+            <a:ext cx="1680293" cy="369332"/>
+          </a:xfrm>
+          <a:prstGeom prst="rect">
+            <a:avLst/>
+          </a:prstGeom>
+          <a:noFill/>
+          <a:ln w="28575">
+            <a:solidFill>
+              <a:schemeClr val="tx1">
+                <a:lumMod val="95000"/>
+                <a:lumOff val="5000"/>
+              </a:schemeClr>
+            </a:solidFill>
+          </a:ln>
+        </p:spPr>
+        <p:txBody>
+          <a:bodyPr wrap="square" rtlCol="0">
+            <a:spAutoFit/>
+          </a:bodyPr>
+          <a:lstStyle/>
+          <a:p>
+            <a:r>
+              <a:rPr lang="en-US" altLang="zh-TW" b="1" dirty="0">
+                <a:latin typeface="微軟正黑體" panose="020B0604030504040204" pitchFamily="34" charset="-120"/>
+                <a:ea typeface="微軟正黑體" panose="020B0604030504040204" pitchFamily="34" charset="-120"/>
+              </a:rPr>
+              <a:t>Medication</a:t>
+            </a:r>
+            <a:endParaRPr lang="zh-TW" altLang="en-US" b="1" dirty="0">
+              <a:latin typeface="微軟正黑體" panose="020B0604030504040204" pitchFamily="34" charset="-120"/>
+              <a:ea typeface="微軟正黑體" panose="020B0604030504040204" pitchFamily="34" charset="-120"/>
+            </a:endParaRPr>
+          </a:p>
+        </p:txBody>
+      </p:sp>
+      <p:sp>
+        <p:nvSpPr>
+          <p:cNvPr id="21" name="TextBox 20">
+            <a:extLst>
+              <a:ext uri="{FF2B5EF4-FFF2-40B4-BE49-F238E27FC236}">
+                <a16:creationId xmlns:a16="http://schemas.microsoft.com/office/drawing/2014/main" id="{03ADB1F5-E8A9-FFA9-EBD4-1EEE4D29743C}"/>
+              </a:ext>
+            </a:extLst>
+          </p:cNvPr>
+          <p:cNvSpPr txBox="1"/>
+          <p:nvPr/>
+        </p:nvSpPr>
+        <p:spPr>
+          <a:xfrm>
+            <a:off x="7040637" y="1440979"/>
+            <a:ext cx="2415474" cy="646331"/>
+          </a:xfrm>
+          <a:prstGeom prst="rect">
+            <a:avLst/>
+          </a:prstGeom>
+          <a:noFill/>
+          <a:ln w="28575">
+            <a:solidFill>
+              <a:schemeClr val="tx1">
+                <a:lumMod val="95000"/>
+                <a:lumOff val="5000"/>
+              </a:schemeClr>
+            </a:solidFill>
+          </a:ln>
+        </p:spPr>
+        <p:txBody>
+          <a:bodyPr wrap="square" rtlCol="0">
+            <a:spAutoFit/>
+          </a:bodyPr>
+          <a:lstStyle/>
+          <a:p>
+            <a:r>
+              <a:rPr lang="en-US" altLang="zh-TW" b="1" dirty="0">
+                <a:latin typeface="微軟正黑體" panose="020B0604030504040204" pitchFamily="34" charset="-120"/>
+                <a:ea typeface="微軟正黑體" panose="020B0604030504040204" pitchFamily="34" charset="-120"/>
+              </a:rPr>
+              <a:t>Medication +</a:t>
+            </a:r>
+          </a:p>
+          <a:p>
+            <a:r>
+              <a:rPr lang="en-US" altLang="zh-TW" b="1" dirty="0">
+                <a:latin typeface="微軟正黑體" panose="020B0604030504040204" pitchFamily="34" charset="-120"/>
+                <a:ea typeface="微軟正黑體" panose="020B0604030504040204" pitchFamily="34" charset="-120"/>
+              </a:rPr>
+              <a:t>Invasive Dental Tx</a:t>
+            </a:r>
+            <a:endParaRPr lang="zh-TW" altLang="en-US" b="1" dirty="0">
+              <a:latin typeface="微軟正黑體" panose="020B0604030504040204" pitchFamily="34" charset="-120"/>
+              <a:ea typeface="微軟正黑體" panose="020B0604030504040204" pitchFamily="34" charset="-120"/>
+            </a:endParaRPr>
+          </a:p>
+        </p:txBody>
+      </p:sp>
+      <p:cxnSp>
+        <p:nvCxnSpPr>
+          <p:cNvPr id="25" name="Straight Connector 24">
+            <a:extLst>
+              <a:ext uri="{FF2B5EF4-FFF2-40B4-BE49-F238E27FC236}">
+                <a16:creationId xmlns:a16="http://schemas.microsoft.com/office/drawing/2014/main" id="{75EB11D5-4255-AE2F-09E1-3948BC601932}"/>
+              </a:ext>
+            </a:extLst>
+          </p:cNvPr>
+          <p:cNvCxnSpPr>
+            <a:cxnSpLocks/>
+          </p:cNvCxnSpPr>
+          <p:nvPr/>
+        </p:nvCxnSpPr>
+        <p:spPr>
+          <a:xfrm>
+            <a:off x="1827586" y="1292578"/>
+            <a:ext cx="12854" cy="6245175"/>
+          </a:xfrm>
+          <a:prstGeom prst="line">
+            <a:avLst/>
+          </a:prstGeom>
+          <a:ln w="57150">
+            <a:solidFill>
+              <a:schemeClr val="tx1"/>
+            </a:solidFill>
+          </a:ln>
+        </p:spPr>
+        <p:style>
+          <a:lnRef idx="2">
+            <a:schemeClr val="accent1"/>
+          </a:lnRef>
+          <a:fillRef idx="0">
+            <a:schemeClr val="accent1"/>
+          </a:fillRef>
+          <a:effectRef idx="1">
+            <a:schemeClr val="accent1"/>
+          </a:effectRef>
+          <a:fontRef idx="minor">
+            <a:schemeClr val="tx1"/>
+          </a:fontRef>
+        </p:style>
+      </p:cxnSp>
+      <p:cxnSp>
+        <p:nvCxnSpPr>
+          <p:cNvPr id="32" name="Straight Connector 31">
+            <a:extLst>
+              <a:ext uri="{FF2B5EF4-FFF2-40B4-BE49-F238E27FC236}">
+                <a16:creationId xmlns:a16="http://schemas.microsoft.com/office/drawing/2014/main" id="{9DE8FAAB-6DC2-3C87-F3C2-F45E05D365B0}"/>
+              </a:ext>
+            </a:extLst>
+          </p:cNvPr>
+          <p:cNvCxnSpPr>
+            <a:cxnSpLocks/>
+            <a:endCxn id="5" idx="1"/>
+          </p:cNvCxnSpPr>
+          <p:nvPr/>
+        </p:nvCxnSpPr>
+        <p:spPr>
+          <a:xfrm>
+            <a:off x="1827586" y="1314370"/>
+            <a:ext cx="138247" cy="0"/>
+          </a:xfrm>
+          <a:prstGeom prst="line">
+            <a:avLst/>
+          </a:prstGeom>
+          <a:ln w="57150">
+            <a:solidFill>
+              <a:schemeClr val="tx1"/>
+            </a:solidFill>
+          </a:ln>
+        </p:spPr>
+        <p:style>
+          <a:lnRef idx="2">
+            <a:schemeClr val="accent1"/>
+          </a:lnRef>
+          <a:fillRef idx="0">
+            <a:schemeClr val="accent1"/>
+          </a:fillRef>
+          <a:effectRef idx="1">
+            <a:schemeClr val="accent1"/>
+          </a:effectRef>
+          <a:fontRef idx="minor">
+            <a:schemeClr val="tx1"/>
+          </a:fontRef>
+        </p:style>
+      </p:cxnSp>
+      <p:cxnSp>
+        <p:nvCxnSpPr>
+          <p:cNvPr id="34" name="Straight Connector 33">
+            <a:extLst>
+              <a:ext uri="{FF2B5EF4-FFF2-40B4-BE49-F238E27FC236}">
+                <a16:creationId xmlns:a16="http://schemas.microsoft.com/office/drawing/2014/main" id="{7AB4DEC5-68BA-37B6-3BE8-7E161ED3A3F1}"/>
+              </a:ext>
+            </a:extLst>
+          </p:cNvPr>
+          <p:cNvCxnSpPr>
+            <a:cxnSpLocks/>
+            <a:endCxn id="6" idx="1"/>
+          </p:cNvCxnSpPr>
+          <p:nvPr/>
+        </p:nvCxnSpPr>
+        <p:spPr>
+          <a:xfrm>
+            <a:off x="1818919" y="7507415"/>
+            <a:ext cx="132354" cy="0"/>
+          </a:xfrm>
+          <a:prstGeom prst="line">
+            <a:avLst/>
+          </a:prstGeom>
+          <a:ln w="57150">
+            <a:solidFill>
+              <a:schemeClr val="tx1"/>
+            </a:solidFill>
+          </a:ln>
+        </p:spPr>
+        <p:style>
+          <a:lnRef idx="2">
+            <a:schemeClr val="accent1"/>
+          </a:lnRef>
+          <a:fillRef idx="0">
+            <a:schemeClr val="accent1"/>
+          </a:fillRef>
+          <a:effectRef idx="1">
+            <a:schemeClr val="accent1"/>
+          </a:effectRef>
+          <a:fontRef idx="minor">
+            <a:schemeClr val="tx1"/>
+          </a:fontRef>
+        </p:style>
+      </p:cxnSp>
+      <p:cxnSp>
+        <p:nvCxnSpPr>
+          <p:cNvPr id="40" name="Straight Connector 39">
+            <a:extLst>
+              <a:ext uri="{FF2B5EF4-FFF2-40B4-BE49-F238E27FC236}">
+                <a16:creationId xmlns:a16="http://schemas.microsoft.com/office/drawing/2014/main" id="{B9B14A2B-F702-609C-7C86-A0E2234E3B4F}"/>
+              </a:ext>
+            </a:extLst>
+          </p:cNvPr>
+          <p:cNvCxnSpPr>
+            <a:cxnSpLocks/>
+            <a:stCxn id="2" idx="3"/>
+          </p:cNvCxnSpPr>
+          <p:nvPr/>
+        </p:nvCxnSpPr>
+        <p:spPr>
+          <a:xfrm>
+            <a:off x="1702193" y="4416722"/>
+            <a:ext cx="123945" cy="0"/>
+          </a:xfrm>
+          <a:prstGeom prst="line">
+            <a:avLst/>
+          </a:prstGeom>
+          <a:ln w="57150">
+            <a:solidFill>
+              <a:schemeClr val="tx1"/>
+            </a:solidFill>
+          </a:ln>
+        </p:spPr>
+        <p:style>
+          <a:lnRef idx="2">
+            <a:schemeClr val="accent1"/>
+          </a:lnRef>
+          <a:fillRef idx="0">
+            <a:schemeClr val="accent1"/>
+          </a:fillRef>
+          <a:effectRef idx="1">
+            <a:schemeClr val="accent1"/>
+          </a:effectRef>
+          <a:fontRef idx="minor">
+            <a:schemeClr val="tx1"/>
+          </a:fontRef>
+        </p:style>
+      </p:cxnSp>
+      <p:cxnSp>
+        <p:nvCxnSpPr>
+          <p:cNvPr id="86" name="Straight Connector 85">
+            <a:extLst>
+              <a:ext uri="{FF2B5EF4-FFF2-40B4-BE49-F238E27FC236}">
+                <a16:creationId xmlns:a16="http://schemas.microsoft.com/office/drawing/2014/main" id="{AC6D1103-0951-4002-678B-2CC141487F0C}"/>
+              </a:ext>
+            </a:extLst>
+          </p:cNvPr>
+          <p:cNvCxnSpPr>
+            <a:cxnSpLocks/>
+          </p:cNvCxnSpPr>
+          <p:nvPr/>
+        </p:nvCxnSpPr>
+        <p:spPr>
+          <a:xfrm>
+            <a:off x="3258726" y="779669"/>
+            <a:ext cx="235062" cy="0"/>
+          </a:xfrm>
+          <a:prstGeom prst="line">
+            <a:avLst/>
+          </a:prstGeom>
+          <a:ln w="38100">
+            <a:solidFill>
+              <a:schemeClr val="tx1"/>
+            </a:solidFill>
+          </a:ln>
+        </p:spPr>
+        <p:style>
+          <a:lnRef idx="2">
+            <a:schemeClr val="accent1"/>
+          </a:lnRef>
+          <a:fillRef idx="0">
+            <a:schemeClr val="accent1"/>
+          </a:fillRef>
+          <a:effectRef idx="1">
+            <a:schemeClr val="accent1"/>
+          </a:effectRef>
+          <a:fontRef idx="minor">
+            <a:schemeClr val="tx1"/>
+          </a:fontRef>
+        </p:style>
+      </p:cxnSp>
+      <p:cxnSp>
+        <p:nvCxnSpPr>
+          <p:cNvPr id="87" name="Straight Connector 86">
+            <a:extLst>
+              <a:ext uri="{FF2B5EF4-FFF2-40B4-BE49-F238E27FC236}">
+                <a16:creationId xmlns:a16="http://schemas.microsoft.com/office/drawing/2014/main" id="{8BD665F0-FB5B-50AA-8A68-4E68AEAF817D}"/>
+              </a:ext>
+            </a:extLst>
+          </p:cNvPr>
+          <p:cNvCxnSpPr>
+            <a:cxnSpLocks/>
+            <a:endCxn id="19" idx="1"/>
+          </p:cNvCxnSpPr>
+          <p:nvPr/>
+        </p:nvCxnSpPr>
+        <p:spPr>
+          <a:xfrm>
+            <a:off x="3275350" y="1764145"/>
+            <a:ext cx="232632" cy="1"/>
+          </a:xfrm>
+          <a:prstGeom prst="line">
+            <a:avLst/>
+          </a:prstGeom>
+          <a:ln w="38100">
+            <a:solidFill>
+              <a:schemeClr val="tx1"/>
+            </a:solidFill>
+          </a:ln>
+        </p:spPr>
+        <p:style>
+          <a:lnRef idx="2">
+            <a:schemeClr val="accent1"/>
+          </a:lnRef>
+          <a:fillRef idx="0">
+            <a:schemeClr val="accent1"/>
+          </a:fillRef>
+          <a:effectRef idx="1">
+            <a:schemeClr val="accent1"/>
+          </a:effectRef>
+          <a:fontRef idx="minor">
+            <a:schemeClr val="tx1"/>
+          </a:fontRef>
+        </p:style>
+      </p:cxnSp>
+      <p:cxnSp>
+        <p:nvCxnSpPr>
+          <p:cNvPr id="102" name="Straight Connector 101">
+            <a:extLst>
+              <a:ext uri="{FF2B5EF4-FFF2-40B4-BE49-F238E27FC236}">
+                <a16:creationId xmlns:a16="http://schemas.microsoft.com/office/drawing/2014/main" id="{FE12DF94-D0C5-520F-ABC8-BA32FD11ACD6}"/>
+              </a:ext>
+            </a:extLst>
+          </p:cNvPr>
+          <p:cNvCxnSpPr>
+            <a:cxnSpLocks/>
+          </p:cNvCxnSpPr>
+          <p:nvPr/>
+        </p:nvCxnSpPr>
+        <p:spPr>
+          <a:xfrm>
+            <a:off x="3275350" y="748975"/>
+            <a:ext cx="0" cy="1042170"/>
+          </a:xfrm>
+          <a:prstGeom prst="line">
+            <a:avLst/>
+          </a:prstGeom>
+          <a:ln w="38100">
+            <a:solidFill>
+              <a:schemeClr val="tx1"/>
+            </a:solidFill>
+          </a:ln>
+        </p:spPr>
+        <p:style>
+          <a:lnRef idx="2">
+            <a:schemeClr val="accent1"/>
+          </a:lnRef>
+          <a:fillRef idx="0">
+            <a:schemeClr val="accent1"/>
+          </a:fillRef>
+          <a:effectRef idx="1">
+            <a:schemeClr val="accent1"/>
+          </a:effectRef>
+          <a:fontRef idx="minor">
+            <a:schemeClr val="tx1"/>
+          </a:fontRef>
+        </p:style>
+      </p:cxnSp>
+      <p:cxnSp>
+        <p:nvCxnSpPr>
+          <p:cNvPr id="103" name="Straight Connector 102">
+            <a:extLst>
+              <a:ext uri="{FF2B5EF4-FFF2-40B4-BE49-F238E27FC236}">
+                <a16:creationId xmlns:a16="http://schemas.microsoft.com/office/drawing/2014/main" id="{5CF87577-350E-FBCE-FC22-CC067B00ED4D}"/>
+              </a:ext>
+            </a:extLst>
+          </p:cNvPr>
+          <p:cNvCxnSpPr>
+            <a:cxnSpLocks/>
+            <a:stCxn id="19" idx="3"/>
+            <a:endCxn id="21" idx="1"/>
+          </p:cNvCxnSpPr>
+          <p:nvPr/>
+        </p:nvCxnSpPr>
+        <p:spPr>
+          <a:xfrm flipV="1">
+            <a:off x="5188275" y="1764145"/>
+            <a:ext cx="1852362" cy="1"/>
+          </a:xfrm>
+          <a:prstGeom prst="line">
+            <a:avLst/>
+          </a:prstGeom>
+          <a:ln w="38100">
+            <a:solidFill>
+              <a:schemeClr val="tx1"/>
+            </a:solidFill>
+          </a:ln>
+        </p:spPr>
+        <p:style>
+          <a:lnRef idx="2">
+            <a:schemeClr val="accent1"/>
+          </a:lnRef>
+          <a:fillRef idx="0">
+            <a:schemeClr val="accent1"/>
+          </a:fillRef>
+          <a:effectRef idx="1">
+            <a:schemeClr val="accent1"/>
+          </a:effectRef>
+          <a:fontRef idx="minor">
+            <a:schemeClr val="tx1"/>
+          </a:fontRef>
+        </p:style>
+      </p:cxnSp>
+      <p:cxnSp>
+        <p:nvCxnSpPr>
+          <p:cNvPr id="118" name="Straight Connector 117">
+            <a:extLst>
+              <a:ext uri="{FF2B5EF4-FFF2-40B4-BE49-F238E27FC236}">
+                <a16:creationId xmlns:a16="http://schemas.microsoft.com/office/drawing/2014/main" id="{E119F596-FF4E-697A-617E-7DAEE91A55F5}"/>
+              </a:ext>
+            </a:extLst>
+          </p:cNvPr>
+          <p:cNvCxnSpPr>
+            <a:cxnSpLocks/>
+          </p:cNvCxnSpPr>
+          <p:nvPr/>
+        </p:nvCxnSpPr>
+        <p:spPr>
+          <a:xfrm>
+            <a:off x="3702677" y="1959637"/>
+            <a:ext cx="7049" cy="3790189"/>
+          </a:xfrm>
+          <a:prstGeom prst="line">
+            <a:avLst/>
+          </a:prstGeom>
+          <a:ln w="38100">
+            <a:solidFill>
+              <a:schemeClr val="tx1"/>
+            </a:solidFill>
+          </a:ln>
+        </p:spPr>
+        <p:style>
+          <a:lnRef idx="2">
+            <a:schemeClr val="accent1"/>
+          </a:lnRef>
+          <a:fillRef idx="0">
+            <a:schemeClr val="accent1"/>
+          </a:fillRef>
+          <a:effectRef idx="1">
+            <a:schemeClr val="accent1"/>
+          </a:effectRef>
+          <a:fontRef idx="minor">
+            <a:schemeClr val="tx1"/>
+          </a:fontRef>
+        </p:style>
+      </p:cxnSp>
+      <p:cxnSp>
+        <p:nvCxnSpPr>
+          <p:cNvPr id="119" name="Straight Connector 118">
+            <a:extLst>
+              <a:ext uri="{FF2B5EF4-FFF2-40B4-BE49-F238E27FC236}">
+                <a16:creationId xmlns:a16="http://schemas.microsoft.com/office/drawing/2014/main" id="{3277DFB1-6E8D-83BE-39D0-9787ED0910D0}"/>
+              </a:ext>
+            </a:extLst>
+          </p:cNvPr>
+          <p:cNvCxnSpPr>
+            <a:cxnSpLocks/>
+            <a:endCxn id="13" idx="1"/>
+          </p:cNvCxnSpPr>
+          <p:nvPr/>
+        </p:nvCxnSpPr>
+        <p:spPr>
+          <a:xfrm>
+            <a:off x="3698544" y="2624113"/>
+            <a:ext cx="311597" cy="942"/>
+          </a:xfrm>
+          <a:prstGeom prst="line">
+            <a:avLst/>
+          </a:prstGeom>
+          <a:ln w="38100">
+            <a:solidFill>
+              <a:schemeClr val="tx1"/>
+            </a:solidFill>
+          </a:ln>
+        </p:spPr>
+        <p:style>
+          <a:lnRef idx="2">
+            <a:schemeClr val="accent1"/>
+          </a:lnRef>
+          <a:fillRef idx="0">
+            <a:schemeClr val="accent1"/>
+          </a:fillRef>
+          <a:effectRef idx="1">
+            <a:schemeClr val="accent1"/>
+          </a:effectRef>
+          <a:fontRef idx="minor">
+            <a:schemeClr val="tx1"/>
+          </a:fontRef>
+        </p:style>
+      </p:cxnSp>
+      <p:cxnSp>
+        <p:nvCxnSpPr>
+          <p:cNvPr id="131" name="Straight Connector 130">
+            <a:extLst>
+              <a:ext uri="{FF2B5EF4-FFF2-40B4-BE49-F238E27FC236}">
+                <a16:creationId xmlns:a16="http://schemas.microsoft.com/office/drawing/2014/main" id="{9577A54A-2071-C79B-206B-AAAC466A5528}"/>
+              </a:ext>
+            </a:extLst>
+          </p:cNvPr>
+          <p:cNvCxnSpPr>
+            <a:cxnSpLocks/>
+            <a:endCxn id="14" idx="1"/>
+          </p:cNvCxnSpPr>
+          <p:nvPr/>
+        </p:nvCxnSpPr>
+        <p:spPr>
+          <a:xfrm>
+            <a:off x="3709730" y="4946459"/>
+            <a:ext cx="321390" cy="2194"/>
+          </a:xfrm>
+          <a:prstGeom prst="line">
+            <a:avLst/>
+          </a:prstGeom>
+          <a:ln w="38100">
+            <a:solidFill>
+              <a:schemeClr val="tx1"/>
+            </a:solidFill>
+          </a:ln>
+        </p:spPr>
+        <p:style>
+          <a:lnRef idx="2">
+            <a:schemeClr val="accent1"/>
+          </a:lnRef>
+          <a:fillRef idx="0">
+            <a:schemeClr val="accent1"/>
+          </a:fillRef>
+          <a:effectRef idx="1">
+            <a:schemeClr val="accent1"/>
+          </a:effectRef>
+          <a:fontRef idx="minor">
+            <a:schemeClr val="tx1"/>
+          </a:fontRef>
+        </p:style>
+      </p:cxnSp>
+      <p:cxnSp>
+        <p:nvCxnSpPr>
+          <p:cNvPr id="137" name="Straight Connector 136">
+            <a:extLst>
+              <a:ext uri="{FF2B5EF4-FFF2-40B4-BE49-F238E27FC236}">
+                <a16:creationId xmlns:a16="http://schemas.microsoft.com/office/drawing/2014/main" id="{6C4C30A5-A18C-02AF-41FC-1D32B916E9F9}"/>
+              </a:ext>
+            </a:extLst>
+          </p:cNvPr>
+          <p:cNvCxnSpPr>
+            <a:cxnSpLocks/>
+          </p:cNvCxnSpPr>
+          <p:nvPr/>
+        </p:nvCxnSpPr>
+        <p:spPr>
+          <a:xfrm>
+            <a:off x="5324080" y="11130985"/>
+            <a:ext cx="0" cy="730583"/>
+          </a:xfrm>
+          <a:prstGeom prst="line">
+            <a:avLst/>
+          </a:prstGeom>
+          <a:ln w="38100">
+            <a:solidFill>
+              <a:schemeClr val="tx1"/>
+            </a:solidFill>
+          </a:ln>
+        </p:spPr>
+        <p:style>
+          <a:lnRef idx="2">
+            <a:schemeClr val="accent1"/>
+          </a:lnRef>
+          <a:fillRef idx="0">
+            <a:schemeClr val="accent1"/>
+          </a:fillRef>
+          <a:effectRef idx="1">
+            <a:schemeClr val="accent1"/>
+          </a:effectRef>
+          <a:fontRef idx="minor">
+            <a:schemeClr val="tx1"/>
+          </a:fontRef>
+        </p:style>
+      </p:cxnSp>
+      <p:sp>
+        <p:nvSpPr>
+          <p:cNvPr id="106" name="TextBox 105">
+            <a:extLst>
+              <a:ext uri="{FF2B5EF4-FFF2-40B4-BE49-F238E27FC236}">
+                <a16:creationId xmlns:a16="http://schemas.microsoft.com/office/drawing/2014/main" id="{AB832210-C105-1102-0FA5-36A7A0B623BD}"/>
+              </a:ext>
+            </a:extLst>
+          </p:cNvPr>
+          <p:cNvSpPr txBox="1"/>
+          <p:nvPr/>
+        </p:nvSpPr>
+        <p:spPr>
+          <a:xfrm>
+            <a:off x="4089402" y="5580901"/>
+            <a:ext cx="1708266" cy="338554"/>
+          </a:xfrm>
+          <a:prstGeom prst="rect">
+            <a:avLst/>
+          </a:prstGeom>
+          <a:noFill/>
+          <a:ln w="28575">
+            <a:solidFill>
+              <a:schemeClr val="tx1">
+                <a:lumMod val="95000"/>
+                <a:lumOff val="5000"/>
+              </a:schemeClr>
+            </a:solidFill>
+          </a:ln>
+        </p:spPr>
+        <p:txBody>
+          <a:bodyPr wrap="square" rtlCol="0">
+            <a:spAutoFit/>
+          </a:bodyPr>
+          <a:lstStyle/>
+          <a:p>
+            <a:r>
+              <a:rPr lang="en-US" altLang="zh-TW" sz="1600" b="1" dirty="0" err="1">
+                <a:latin typeface="微軟正黑體" panose="020B0604030504040204" pitchFamily="34" charset="-120"/>
+                <a:ea typeface="微軟正黑體" panose="020B0604030504040204" pitchFamily="34" charset="-120"/>
+              </a:rPr>
+              <a:t>Romosozumab</a:t>
+            </a:r>
+            <a:endParaRPr lang="zh-TW" altLang="en-US" sz="1600" b="1" dirty="0">
+              <a:latin typeface="微軟正黑體" panose="020B0604030504040204" pitchFamily="34" charset="-120"/>
+              <a:ea typeface="微軟正黑體" panose="020B0604030504040204" pitchFamily="34" charset="-120"/>
+            </a:endParaRPr>
+          </a:p>
+        </p:txBody>
+      </p:sp>
+      <p:cxnSp>
+        <p:nvCxnSpPr>
+          <p:cNvPr id="107" name="Straight Connector 106">
+            <a:extLst>
+              <a:ext uri="{FF2B5EF4-FFF2-40B4-BE49-F238E27FC236}">
+                <a16:creationId xmlns:a16="http://schemas.microsoft.com/office/drawing/2014/main" id="{7CA1F59B-A8B4-C67E-671B-78FBE5C4CE5B}"/>
+              </a:ext>
+            </a:extLst>
+          </p:cNvPr>
+          <p:cNvCxnSpPr>
+            <a:cxnSpLocks/>
+            <a:endCxn id="106" idx="1"/>
+          </p:cNvCxnSpPr>
+          <p:nvPr/>
+        </p:nvCxnSpPr>
+        <p:spPr>
+          <a:xfrm flipV="1">
+            <a:off x="3698544" y="5750178"/>
+            <a:ext cx="390858" cy="5184"/>
+          </a:xfrm>
+          <a:prstGeom prst="line">
+            <a:avLst/>
+          </a:prstGeom>
+          <a:ln w="38100">
+            <a:solidFill>
+              <a:schemeClr val="tx1"/>
+            </a:solidFill>
+          </a:ln>
+        </p:spPr>
+        <p:style>
+          <a:lnRef idx="2">
+            <a:schemeClr val="accent1"/>
+          </a:lnRef>
+          <a:fillRef idx="0">
+            <a:schemeClr val="accent1"/>
+          </a:fillRef>
+          <a:effectRef idx="1">
+            <a:schemeClr val="accent1"/>
+          </a:effectRef>
+          <a:fontRef idx="minor">
+            <a:schemeClr val="tx1"/>
+          </a:fontRef>
+        </p:style>
+      </p:cxnSp>
+      <p:sp>
+        <p:nvSpPr>
+          <p:cNvPr id="123" name="TextBox 122">
+            <a:extLst>
+              <a:ext uri="{FF2B5EF4-FFF2-40B4-BE49-F238E27FC236}">
+                <a16:creationId xmlns:a16="http://schemas.microsoft.com/office/drawing/2014/main" id="{22CE9272-C386-9CA0-4BB5-CE1610B93A19}"/>
+              </a:ext>
+            </a:extLst>
+          </p:cNvPr>
+          <p:cNvSpPr txBox="1"/>
+          <p:nvPr/>
+        </p:nvSpPr>
+        <p:spPr>
+          <a:xfrm>
+            <a:off x="4698808" y="3179691"/>
+            <a:ext cx="2376511" cy="338554"/>
+          </a:xfrm>
+          <a:prstGeom prst="rect">
+            <a:avLst/>
+          </a:prstGeom>
+          <a:noFill/>
+          <a:ln w="28575">
+            <a:solidFill>
+              <a:schemeClr val="tx1">
+                <a:lumMod val="95000"/>
+                <a:lumOff val="5000"/>
+              </a:schemeClr>
+            </a:solidFill>
+          </a:ln>
+        </p:spPr>
+        <p:txBody>
+          <a:bodyPr wrap="square" rtlCol="0">
+            <a:spAutoFit/>
+          </a:bodyPr>
+          <a:lstStyle/>
+          <a:p>
+            <a:r>
+              <a:rPr lang="en-US" altLang="zh-TW" sz="1600" b="1" dirty="0">
+                <a:latin typeface="微軟正黑體" panose="020B0604030504040204" pitchFamily="34" charset="-120"/>
+                <a:ea typeface="微軟正黑體" panose="020B0604030504040204" pitchFamily="34" charset="-120"/>
+              </a:rPr>
+              <a:t>Oral Bisphosphonate</a:t>
+            </a:r>
+            <a:endParaRPr lang="zh-TW" altLang="en-US" sz="1600" b="1" dirty="0">
+              <a:latin typeface="微軟正黑體" panose="020B0604030504040204" pitchFamily="34" charset="-120"/>
+              <a:ea typeface="微軟正黑體" panose="020B0604030504040204" pitchFamily="34" charset="-120"/>
+            </a:endParaRPr>
+          </a:p>
+        </p:txBody>
+      </p:sp>
+      <p:cxnSp>
+        <p:nvCxnSpPr>
+          <p:cNvPr id="141" name="Straight Connector 140">
+            <a:extLst>
+              <a:ext uri="{FF2B5EF4-FFF2-40B4-BE49-F238E27FC236}">
+                <a16:creationId xmlns:a16="http://schemas.microsoft.com/office/drawing/2014/main" id="{9C9BCDE4-4E7A-9E91-DED5-79408B6A85F3}"/>
+              </a:ext>
+            </a:extLst>
+          </p:cNvPr>
+          <p:cNvCxnSpPr>
+            <a:cxnSpLocks/>
+          </p:cNvCxnSpPr>
+          <p:nvPr/>
+        </p:nvCxnSpPr>
+        <p:spPr>
+          <a:xfrm>
+            <a:off x="4353805" y="3350570"/>
+            <a:ext cx="345005" cy="0"/>
+          </a:xfrm>
+          <a:prstGeom prst="line">
+            <a:avLst/>
+          </a:prstGeom>
+          <a:ln w="38100">
+            <a:solidFill>
+              <a:schemeClr val="tx1"/>
+            </a:solidFill>
+          </a:ln>
+        </p:spPr>
+        <p:style>
+          <a:lnRef idx="2">
+            <a:schemeClr val="accent1"/>
+          </a:lnRef>
+          <a:fillRef idx="0">
+            <a:schemeClr val="accent1"/>
+          </a:fillRef>
+          <a:effectRef idx="1">
+            <a:schemeClr val="accent1"/>
+          </a:effectRef>
+          <a:fontRef idx="minor">
+            <a:schemeClr val="tx1"/>
+          </a:fontRef>
+        </p:style>
+      </p:cxnSp>
+      <p:cxnSp>
+        <p:nvCxnSpPr>
+          <p:cNvPr id="142" name="Straight Connector 141">
+            <a:extLst>
+              <a:ext uri="{FF2B5EF4-FFF2-40B4-BE49-F238E27FC236}">
+                <a16:creationId xmlns:a16="http://schemas.microsoft.com/office/drawing/2014/main" id="{129167AE-23DF-396C-09D9-EC03BE479B80}"/>
+              </a:ext>
+            </a:extLst>
+          </p:cNvPr>
+          <p:cNvCxnSpPr>
+            <a:cxnSpLocks/>
+            <a:endCxn id="148" idx="1"/>
+          </p:cNvCxnSpPr>
+          <p:nvPr/>
+        </p:nvCxnSpPr>
+        <p:spPr>
+          <a:xfrm flipV="1">
+            <a:off x="4343994" y="4049232"/>
+            <a:ext cx="354814" cy="1"/>
+          </a:xfrm>
+          <a:prstGeom prst="line">
+            <a:avLst/>
+          </a:prstGeom>
+          <a:ln w="38100">
+            <a:solidFill>
+              <a:schemeClr val="tx1"/>
+            </a:solidFill>
+          </a:ln>
+        </p:spPr>
+        <p:style>
+          <a:lnRef idx="2">
+            <a:schemeClr val="accent1"/>
+          </a:lnRef>
+          <a:fillRef idx="0">
+            <a:schemeClr val="accent1"/>
+          </a:fillRef>
+          <a:effectRef idx="1">
+            <a:schemeClr val="accent1"/>
+          </a:effectRef>
+          <a:fontRef idx="minor">
+            <a:schemeClr val="tx1"/>
+          </a:fontRef>
+        </p:style>
+      </p:cxnSp>
+      <p:cxnSp>
+        <p:nvCxnSpPr>
+          <p:cNvPr id="143" name="Straight Connector 142">
+            <a:extLst>
+              <a:ext uri="{FF2B5EF4-FFF2-40B4-BE49-F238E27FC236}">
+                <a16:creationId xmlns:a16="http://schemas.microsoft.com/office/drawing/2014/main" id="{4EF397CF-A4FB-35B0-00D7-901E35E7ABCC}"/>
+              </a:ext>
+            </a:extLst>
+          </p:cNvPr>
+          <p:cNvCxnSpPr>
+            <a:cxnSpLocks/>
+          </p:cNvCxnSpPr>
+          <p:nvPr/>
+        </p:nvCxnSpPr>
+        <p:spPr>
+          <a:xfrm flipH="1" flipV="1">
+            <a:off x="4343994" y="2786390"/>
+            <a:ext cx="9811" cy="1262842"/>
+          </a:xfrm>
+          <a:prstGeom prst="line">
+            <a:avLst/>
+          </a:prstGeom>
+          <a:ln w="38100">
+            <a:solidFill>
+              <a:schemeClr val="tx1"/>
+            </a:solidFill>
+          </a:ln>
+        </p:spPr>
+        <p:style>
+          <a:lnRef idx="2">
+            <a:schemeClr val="accent1"/>
+          </a:lnRef>
+          <a:fillRef idx="0">
+            <a:schemeClr val="accent1"/>
+          </a:fillRef>
+          <a:effectRef idx="1">
+            <a:schemeClr val="accent1"/>
+          </a:effectRef>
+          <a:fontRef idx="minor">
+            <a:schemeClr val="tx1"/>
+          </a:fontRef>
+        </p:style>
+      </p:cxnSp>
+      <p:sp>
+        <p:nvSpPr>
+          <p:cNvPr id="148" name="TextBox 147">
+            <a:extLst>
+              <a:ext uri="{FF2B5EF4-FFF2-40B4-BE49-F238E27FC236}">
+                <a16:creationId xmlns:a16="http://schemas.microsoft.com/office/drawing/2014/main" id="{3D42CE6A-8EE1-3C98-E8A6-52A47A60064C}"/>
+              </a:ext>
+            </a:extLst>
+          </p:cNvPr>
+          <p:cNvSpPr txBox="1"/>
+          <p:nvPr/>
+        </p:nvSpPr>
+        <p:spPr>
+          <a:xfrm>
+            <a:off x="4698808" y="3879955"/>
+            <a:ext cx="2376511" cy="338554"/>
+          </a:xfrm>
+          <a:prstGeom prst="rect">
+            <a:avLst/>
+          </a:prstGeom>
+          <a:noFill/>
+          <a:ln w="28575">
+            <a:solidFill>
+              <a:schemeClr val="tx1">
+                <a:lumMod val="95000"/>
+                <a:lumOff val="5000"/>
+              </a:schemeClr>
+            </a:solidFill>
+          </a:ln>
+        </p:spPr>
+        <p:txBody>
+          <a:bodyPr wrap="square" rtlCol="0">
+            <a:spAutoFit/>
+          </a:bodyPr>
+          <a:lstStyle/>
+          <a:p>
+            <a:r>
+              <a:rPr lang="en-US" altLang="zh-TW" sz="1600" b="1" dirty="0">
+                <a:latin typeface="微軟正黑體" panose="020B0604030504040204" pitchFamily="34" charset="-120"/>
+                <a:ea typeface="微軟正黑體" panose="020B0604030504040204" pitchFamily="34" charset="-120"/>
+              </a:rPr>
+              <a:t>IV/SC Bisphosphonate</a:t>
+            </a:r>
+            <a:endParaRPr lang="zh-TW" altLang="en-US" sz="1600" b="1" dirty="0">
+              <a:latin typeface="微軟正黑體" panose="020B0604030504040204" pitchFamily="34" charset="-120"/>
+              <a:ea typeface="微軟正黑體" panose="020B0604030504040204" pitchFamily="34" charset="-120"/>
+            </a:endParaRPr>
+          </a:p>
+        </p:txBody>
+      </p:sp>
+      <p:sp>
+        <p:nvSpPr>
+          <p:cNvPr id="150" name="TextBox 149">
+            <a:extLst>
+              <a:ext uri="{FF2B5EF4-FFF2-40B4-BE49-F238E27FC236}">
+                <a16:creationId xmlns:a16="http://schemas.microsoft.com/office/drawing/2014/main" id="{7AAAD8B7-F8D5-20F2-F09F-49169D960E8A}"/>
+              </a:ext>
+            </a:extLst>
+          </p:cNvPr>
+          <p:cNvSpPr txBox="1"/>
+          <p:nvPr/>
+        </p:nvSpPr>
+        <p:spPr>
+          <a:xfrm>
+            <a:off x="7698866" y="2622215"/>
+            <a:ext cx="1808974" cy="338554"/>
+          </a:xfrm>
+          <a:prstGeom prst="rect">
+            <a:avLst/>
+          </a:prstGeom>
+          <a:noFill/>
+          <a:ln w="28575">
+            <a:solidFill>
+              <a:schemeClr val="tx1">
+                <a:lumMod val="95000"/>
+                <a:lumOff val="5000"/>
+              </a:schemeClr>
+            </a:solidFill>
+          </a:ln>
+        </p:spPr>
+        <p:txBody>
+          <a:bodyPr wrap="square" rtlCol="0">
+            <a:spAutoFit/>
+          </a:bodyPr>
+          <a:lstStyle/>
+          <a:p>
+            <a:r>
+              <a:rPr lang="en-US" altLang="zh-TW" sz="1600" b="1" dirty="0">
+                <a:latin typeface="微軟正黑體" panose="020B0604030504040204" pitchFamily="34" charset="-120"/>
+                <a:ea typeface="微軟正黑體" panose="020B0604030504040204" pitchFamily="34" charset="-120"/>
+              </a:rPr>
+              <a:t>Bisphosphonate</a:t>
+            </a:r>
+            <a:endParaRPr lang="zh-TW" altLang="en-US" sz="1600" b="1" dirty="0">
+              <a:latin typeface="微軟正黑體" panose="020B0604030504040204" pitchFamily="34" charset="-120"/>
+              <a:ea typeface="微軟正黑體" panose="020B0604030504040204" pitchFamily="34" charset="-120"/>
+            </a:endParaRPr>
+          </a:p>
+        </p:txBody>
+      </p:sp>
+      <p:sp>
+        <p:nvSpPr>
+          <p:cNvPr id="151" name="TextBox 150">
+            <a:extLst>
+              <a:ext uri="{FF2B5EF4-FFF2-40B4-BE49-F238E27FC236}">
+                <a16:creationId xmlns:a16="http://schemas.microsoft.com/office/drawing/2014/main" id="{1B87A74B-4528-7303-810B-94F36C462C15}"/>
+              </a:ext>
+            </a:extLst>
+          </p:cNvPr>
+          <p:cNvSpPr txBox="1"/>
+          <p:nvPr/>
+        </p:nvSpPr>
+        <p:spPr>
+          <a:xfrm>
+            <a:off x="7753752" y="4929273"/>
+            <a:ext cx="1386600" cy="338554"/>
+          </a:xfrm>
+          <a:prstGeom prst="rect">
+            <a:avLst/>
+          </a:prstGeom>
+          <a:noFill/>
+          <a:ln w="28575">
+            <a:solidFill>
+              <a:schemeClr val="tx1">
+                <a:lumMod val="95000"/>
+                <a:lumOff val="5000"/>
+              </a:schemeClr>
+            </a:solidFill>
+          </a:ln>
+        </p:spPr>
+        <p:txBody>
+          <a:bodyPr wrap="square" rtlCol="0">
+            <a:spAutoFit/>
+          </a:bodyPr>
+          <a:lstStyle/>
+          <a:p>
+            <a:r>
+              <a:rPr lang="en-US" altLang="zh-TW" sz="1600" b="1" dirty="0">
+                <a:latin typeface="微軟正黑體" panose="020B0604030504040204" pitchFamily="34" charset="-120"/>
+                <a:ea typeface="微軟正黑體" panose="020B0604030504040204" pitchFamily="34" charset="-120"/>
+              </a:rPr>
+              <a:t>Denosumab</a:t>
+            </a:r>
+            <a:endParaRPr lang="zh-TW" altLang="en-US" sz="1600" b="1" dirty="0">
+              <a:latin typeface="微軟正黑體" panose="020B0604030504040204" pitchFamily="34" charset="-120"/>
+              <a:ea typeface="微軟正黑體" panose="020B0604030504040204" pitchFamily="34" charset="-120"/>
+            </a:endParaRPr>
+          </a:p>
+        </p:txBody>
+      </p:sp>
+      <p:cxnSp>
+        <p:nvCxnSpPr>
+          <p:cNvPr id="152" name="Straight Connector 151">
+            <a:extLst>
+              <a:ext uri="{FF2B5EF4-FFF2-40B4-BE49-F238E27FC236}">
+                <a16:creationId xmlns:a16="http://schemas.microsoft.com/office/drawing/2014/main" id="{06B4CD37-4908-F4A3-84A5-E49E2FCB141C}"/>
+              </a:ext>
+            </a:extLst>
+          </p:cNvPr>
+          <p:cNvCxnSpPr>
+            <a:cxnSpLocks/>
+          </p:cNvCxnSpPr>
+          <p:nvPr/>
+        </p:nvCxnSpPr>
+        <p:spPr>
+          <a:xfrm flipH="1">
+            <a:off x="7367508" y="2087310"/>
+            <a:ext cx="10638" cy="3030620"/>
+          </a:xfrm>
+          <a:prstGeom prst="line">
+            <a:avLst/>
+          </a:prstGeom>
+          <a:ln w="38100">
+            <a:solidFill>
+              <a:schemeClr val="tx1"/>
+            </a:solidFill>
+          </a:ln>
+        </p:spPr>
+        <p:style>
+          <a:lnRef idx="2">
+            <a:schemeClr val="accent1"/>
+          </a:lnRef>
+          <a:fillRef idx="0">
+            <a:schemeClr val="accent1"/>
+          </a:fillRef>
+          <a:effectRef idx="1">
+            <a:schemeClr val="accent1"/>
+          </a:effectRef>
+          <a:fontRef idx="minor">
+            <a:schemeClr val="tx1"/>
+          </a:fontRef>
+        </p:style>
+      </p:cxnSp>
+      <p:cxnSp>
+        <p:nvCxnSpPr>
+          <p:cNvPr id="153" name="Straight Connector 152">
+            <a:extLst>
+              <a:ext uri="{FF2B5EF4-FFF2-40B4-BE49-F238E27FC236}">
+                <a16:creationId xmlns:a16="http://schemas.microsoft.com/office/drawing/2014/main" id="{8E83CAAD-E595-5324-1D90-9CE48E55B65E}"/>
+              </a:ext>
+            </a:extLst>
+          </p:cNvPr>
+          <p:cNvCxnSpPr>
+            <a:cxnSpLocks/>
+            <a:endCxn id="150" idx="1"/>
+          </p:cNvCxnSpPr>
+          <p:nvPr/>
+        </p:nvCxnSpPr>
+        <p:spPr>
+          <a:xfrm>
+            <a:off x="7367508" y="2791492"/>
+            <a:ext cx="331358" cy="0"/>
+          </a:xfrm>
+          <a:prstGeom prst="line">
+            <a:avLst/>
+          </a:prstGeom>
+          <a:ln w="38100">
+            <a:solidFill>
+              <a:schemeClr val="tx1"/>
+            </a:solidFill>
+          </a:ln>
+        </p:spPr>
+        <p:style>
+          <a:lnRef idx="2">
+            <a:schemeClr val="accent1"/>
+          </a:lnRef>
+          <a:fillRef idx="0">
+            <a:schemeClr val="accent1"/>
+          </a:fillRef>
+          <a:effectRef idx="1">
+            <a:schemeClr val="accent1"/>
+          </a:effectRef>
+          <a:fontRef idx="minor">
+            <a:schemeClr val="tx1"/>
+          </a:fontRef>
+        </p:style>
+      </p:cxnSp>
+      <p:cxnSp>
+        <p:nvCxnSpPr>
+          <p:cNvPr id="154" name="Straight Connector 153">
+            <a:extLst>
+              <a:ext uri="{FF2B5EF4-FFF2-40B4-BE49-F238E27FC236}">
+                <a16:creationId xmlns:a16="http://schemas.microsoft.com/office/drawing/2014/main" id="{BCD812B0-9F78-C38A-2050-29CF8E964B9C}"/>
+              </a:ext>
+            </a:extLst>
+          </p:cNvPr>
+          <p:cNvCxnSpPr>
+            <a:cxnSpLocks/>
+            <a:endCxn id="151" idx="1"/>
+          </p:cNvCxnSpPr>
+          <p:nvPr/>
+        </p:nvCxnSpPr>
+        <p:spPr>
+          <a:xfrm>
+            <a:off x="7378146" y="5098550"/>
+            <a:ext cx="375606" cy="0"/>
+          </a:xfrm>
+          <a:prstGeom prst="line">
+            <a:avLst/>
+          </a:prstGeom>
+          <a:ln w="38100">
+            <a:solidFill>
+              <a:schemeClr val="tx1"/>
+            </a:solidFill>
+          </a:ln>
+        </p:spPr>
+        <p:style>
+          <a:lnRef idx="2">
+            <a:schemeClr val="accent1"/>
+          </a:lnRef>
+          <a:fillRef idx="0">
+            <a:schemeClr val="accent1"/>
+          </a:fillRef>
+          <a:effectRef idx="1">
+            <a:schemeClr val="accent1"/>
+          </a:effectRef>
+          <a:fontRef idx="minor">
+            <a:schemeClr val="tx1"/>
+          </a:fontRef>
+        </p:style>
+      </p:cxnSp>
+      <p:sp>
+        <p:nvSpPr>
+          <p:cNvPr id="157" name="TextBox 156">
+            <a:extLst>
+              <a:ext uri="{FF2B5EF4-FFF2-40B4-BE49-F238E27FC236}">
+                <a16:creationId xmlns:a16="http://schemas.microsoft.com/office/drawing/2014/main" id="{ACB729AF-A03F-554F-B952-FDD60F6CFF2F}"/>
+              </a:ext>
+            </a:extLst>
+          </p:cNvPr>
+          <p:cNvSpPr txBox="1"/>
+          <p:nvPr/>
+        </p:nvSpPr>
+        <p:spPr>
+          <a:xfrm>
+            <a:off x="8201388" y="3336940"/>
+            <a:ext cx="2393893" cy="338554"/>
+          </a:xfrm>
+          <a:prstGeom prst="rect">
+            <a:avLst/>
+          </a:prstGeom>
+          <a:noFill/>
+          <a:ln w="28575">
+            <a:solidFill>
+              <a:schemeClr val="tx1">
+                <a:lumMod val="95000"/>
+                <a:lumOff val="5000"/>
+              </a:schemeClr>
+            </a:solidFill>
+          </a:ln>
+        </p:spPr>
+        <p:txBody>
+          <a:bodyPr wrap="square" rtlCol="0">
+            <a:spAutoFit/>
+          </a:bodyPr>
+          <a:lstStyle/>
+          <a:p>
+            <a:r>
+              <a:rPr lang="en-US" altLang="zh-TW" sz="1600" b="1" dirty="0">
+                <a:latin typeface="微軟正黑體" panose="020B0604030504040204" pitchFamily="34" charset="-120"/>
+                <a:ea typeface="微軟正黑體" panose="020B0604030504040204" pitchFamily="34" charset="-120"/>
+              </a:rPr>
+              <a:t>Oral Bisphosphonate</a:t>
+            </a:r>
+            <a:endParaRPr lang="zh-TW" altLang="en-US" sz="1600" b="1" dirty="0">
+              <a:latin typeface="微軟正黑體" panose="020B0604030504040204" pitchFamily="34" charset="-120"/>
+              <a:ea typeface="微軟正黑體" panose="020B0604030504040204" pitchFamily="34" charset="-120"/>
+            </a:endParaRPr>
+          </a:p>
+        </p:txBody>
+      </p:sp>
+      <p:cxnSp>
+        <p:nvCxnSpPr>
+          <p:cNvPr id="158" name="Straight Connector 157">
+            <a:extLst>
+              <a:ext uri="{FF2B5EF4-FFF2-40B4-BE49-F238E27FC236}">
+                <a16:creationId xmlns:a16="http://schemas.microsoft.com/office/drawing/2014/main" id="{D3A6DCEF-D8B5-4B4B-3664-6AF04A2553EA}"/>
+              </a:ext>
+            </a:extLst>
+          </p:cNvPr>
+          <p:cNvCxnSpPr>
+            <a:cxnSpLocks/>
+          </p:cNvCxnSpPr>
+          <p:nvPr/>
+        </p:nvCxnSpPr>
+        <p:spPr>
+          <a:xfrm>
+            <a:off x="7839181" y="3502219"/>
+            <a:ext cx="362209" cy="5600"/>
+          </a:xfrm>
+          <a:prstGeom prst="line">
+            <a:avLst/>
+          </a:prstGeom>
+          <a:ln w="38100">
+            <a:solidFill>
+              <a:schemeClr val="tx1"/>
+            </a:solidFill>
+          </a:ln>
+        </p:spPr>
+        <p:style>
+          <a:lnRef idx="2">
+            <a:schemeClr val="accent1"/>
+          </a:lnRef>
+          <a:fillRef idx="0">
+            <a:schemeClr val="accent1"/>
+          </a:fillRef>
+          <a:effectRef idx="1">
+            <a:schemeClr val="accent1"/>
+          </a:effectRef>
+          <a:fontRef idx="minor">
+            <a:schemeClr val="tx1"/>
+          </a:fontRef>
+        </p:style>
+      </p:cxnSp>
+      <p:cxnSp>
+        <p:nvCxnSpPr>
+          <p:cNvPr id="159" name="Straight Connector 158">
+            <a:extLst>
+              <a:ext uri="{FF2B5EF4-FFF2-40B4-BE49-F238E27FC236}">
+                <a16:creationId xmlns:a16="http://schemas.microsoft.com/office/drawing/2014/main" id="{23861327-3B76-9F4F-8053-D41A1D54B3E0}"/>
+              </a:ext>
+            </a:extLst>
+          </p:cNvPr>
+          <p:cNvCxnSpPr>
+            <a:cxnSpLocks/>
+            <a:endCxn id="161" idx="1"/>
+          </p:cNvCxnSpPr>
+          <p:nvPr/>
+        </p:nvCxnSpPr>
+        <p:spPr>
+          <a:xfrm>
+            <a:off x="7845357" y="4278919"/>
+            <a:ext cx="356029" cy="0"/>
+          </a:xfrm>
+          <a:prstGeom prst="line">
+            <a:avLst/>
+          </a:prstGeom>
+          <a:ln w="38100">
+            <a:solidFill>
+              <a:schemeClr val="tx1"/>
+            </a:solidFill>
+          </a:ln>
+        </p:spPr>
+        <p:style>
+          <a:lnRef idx="2">
+            <a:schemeClr val="accent1"/>
+          </a:lnRef>
+          <a:fillRef idx="0">
+            <a:schemeClr val="accent1"/>
+          </a:fillRef>
+          <a:effectRef idx="1">
+            <a:schemeClr val="accent1"/>
+          </a:effectRef>
+          <a:fontRef idx="minor">
+            <a:schemeClr val="tx1"/>
+          </a:fontRef>
+        </p:style>
+      </p:cxnSp>
+      <p:cxnSp>
+        <p:nvCxnSpPr>
+          <p:cNvPr id="160" name="Straight Connector 159">
+            <a:extLst>
+              <a:ext uri="{FF2B5EF4-FFF2-40B4-BE49-F238E27FC236}">
+                <a16:creationId xmlns:a16="http://schemas.microsoft.com/office/drawing/2014/main" id="{49D8C212-6E1E-5A4C-A0D2-971BCF85A5F4}"/>
+              </a:ext>
+            </a:extLst>
+          </p:cNvPr>
+          <p:cNvCxnSpPr>
+            <a:cxnSpLocks/>
+          </p:cNvCxnSpPr>
+          <p:nvPr/>
+        </p:nvCxnSpPr>
+        <p:spPr>
+          <a:xfrm flipV="1">
+            <a:off x="7839181" y="2975471"/>
+            <a:ext cx="0" cy="1303448"/>
+          </a:xfrm>
+          <a:prstGeom prst="line">
+            <a:avLst/>
+          </a:prstGeom>
+          <a:ln w="38100">
+            <a:solidFill>
+              <a:schemeClr val="tx1"/>
+            </a:solidFill>
+          </a:ln>
+        </p:spPr>
+        <p:style>
+          <a:lnRef idx="2">
+            <a:schemeClr val="accent1"/>
+          </a:lnRef>
+          <a:fillRef idx="0">
+            <a:schemeClr val="accent1"/>
+          </a:fillRef>
+          <a:effectRef idx="1">
+            <a:schemeClr val="accent1"/>
+          </a:effectRef>
+          <a:fontRef idx="minor">
+            <a:schemeClr val="tx1"/>
+          </a:fontRef>
+        </p:style>
+      </p:cxnSp>
+      <p:sp>
+        <p:nvSpPr>
+          <p:cNvPr id="161" name="TextBox 160">
+            <a:extLst>
+              <a:ext uri="{FF2B5EF4-FFF2-40B4-BE49-F238E27FC236}">
+                <a16:creationId xmlns:a16="http://schemas.microsoft.com/office/drawing/2014/main" id="{C9392ADC-3101-DED1-2FEC-F3D358D86BB5}"/>
+              </a:ext>
+            </a:extLst>
+          </p:cNvPr>
+          <p:cNvSpPr txBox="1"/>
+          <p:nvPr/>
+        </p:nvSpPr>
+        <p:spPr>
+          <a:xfrm>
+            <a:off x="8201386" y="4109642"/>
+            <a:ext cx="2393893" cy="338554"/>
+          </a:xfrm>
+          <a:prstGeom prst="rect">
+            <a:avLst/>
+          </a:prstGeom>
+          <a:noFill/>
+          <a:ln w="28575">
+            <a:solidFill>
+              <a:schemeClr val="tx1">
+                <a:lumMod val="95000"/>
+                <a:lumOff val="5000"/>
+              </a:schemeClr>
+            </a:solidFill>
+          </a:ln>
+        </p:spPr>
+        <p:txBody>
+          <a:bodyPr wrap="square" rtlCol="0">
+            <a:spAutoFit/>
+          </a:bodyPr>
+          <a:lstStyle/>
+          <a:p>
+            <a:r>
+              <a:rPr lang="en-US" altLang="zh-TW" sz="1600" b="1" dirty="0">
+                <a:latin typeface="微軟正黑體" panose="020B0604030504040204" pitchFamily="34" charset="-120"/>
+                <a:ea typeface="微軟正黑體" panose="020B0604030504040204" pitchFamily="34" charset="-120"/>
+              </a:rPr>
+              <a:t>IV/SC Bisphosphonate</a:t>
+            </a:r>
+            <a:endParaRPr lang="zh-TW" altLang="en-US" sz="1600" b="1" dirty="0">
+              <a:latin typeface="微軟正黑體" panose="020B0604030504040204" pitchFamily="34" charset="-120"/>
+              <a:ea typeface="微軟正黑體" panose="020B0604030504040204" pitchFamily="34" charset="-120"/>
+            </a:endParaRPr>
+          </a:p>
+        </p:txBody>
+      </p:sp>
+      <p:cxnSp>
+        <p:nvCxnSpPr>
+          <p:cNvPr id="166" name="Straight Connector 165">
+            <a:extLst>
+              <a:ext uri="{FF2B5EF4-FFF2-40B4-BE49-F238E27FC236}">
+                <a16:creationId xmlns:a16="http://schemas.microsoft.com/office/drawing/2014/main" id="{4C34DAA7-C5C1-F1B2-1955-142556F7C22B}"/>
+              </a:ext>
+            </a:extLst>
+          </p:cNvPr>
+          <p:cNvCxnSpPr>
+            <a:cxnSpLocks/>
+          </p:cNvCxnSpPr>
+          <p:nvPr/>
+        </p:nvCxnSpPr>
+        <p:spPr>
+          <a:xfrm>
+            <a:off x="3129761" y="1314370"/>
+            <a:ext cx="145589" cy="0"/>
+          </a:xfrm>
+          <a:prstGeom prst="line">
+            <a:avLst/>
+          </a:prstGeom>
+          <a:ln w="38100">
+            <a:solidFill>
+              <a:schemeClr val="tx1"/>
+            </a:solidFill>
+          </a:ln>
+        </p:spPr>
+        <p:style>
+          <a:lnRef idx="2">
+            <a:schemeClr val="accent1"/>
+          </a:lnRef>
+          <a:fillRef idx="0">
+            <a:schemeClr val="accent1"/>
+          </a:fillRef>
+          <a:effectRef idx="1">
+            <a:schemeClr val="accent1"/>
+          </a:effectRef>
+          <a:fontRef idx="minor">
+            <a:schemeClr val="tx1"/>
+          </a:fontRef>
+        </p:style>
+      </p:cxnSp>
+      <p:sp>
+        <p:nvSpPr>
+          <p:cNvPr id="200" name="TextBox 199">
+            <a:extLst>
+              <a:ext uri="{FF2B5EF4-FFF2-40B4-BE49-F238E27FC236}">
+                <a16:creationId xmlns:a16="http://schemas.microsoft.com/office/drawing/2014/main" id="{AF277D23-E859-254C-A6B3-43488D986E75}"/>
+              </a:ext>
+            </a:extLst>
+          </p:cNvPr>
+          <p:cNvSpPr txBox="1"/>
+          <p:nvPr/>
+        </p:nvSpPr>
+        <p:spPr>
+          <a:xfrm>
+            <a:off x="3955705" y="8728803"/>
+            <a:ext cx="1808974" cy="338554"/>
+          </a:xfrm>
+          <a:prstGeom prst="rect">
+            <a:avLst/>
+          </a:prstGeom>
+          <a:noFill/>
+          <a:ln w="28575">
+            <a:solidFill>
+              <a:schemeClr val="tx1">
+                <a:lumMod val="95000"/>
+                <a:lumOff val="5000"/>
+              </a:schemeClr>
+            </a:solidFill>
+          </a:ln>
+        </p:spPr>
+        <p:txBody>
+          <a:bodyPr wrap="square" rtlCol="0">
+            <a:spAutoFit/>
+          </a:bodyPr>
+          <a:lstStyle/>
+          <a:p>
+            <a:r>
+              <a:rPr lang="en-US" altLang="zh-TW" sz="1600" b="1" dirty="0">
+                <a:latin typeface="微軟正黑體" panose="020B0604030504040204" pitchFamily="34" charset="-120"/>
+                <a:ea typeface="微軟正黑體" panose="020B0604030504040204" pitchFamily="34" charset="-120"/>
+              </a:rPr>
+              <a:t>Bisphosphonate</a:t>
+            </a:r>
+            <a:endParaRPr lang="zh-TW" altLang="en-US" sz="1600" b="1" dirty="0">
+              <a:latin typeface="微軟正黑體" panose="020B0604030504040204" pitchFamily="34" charset="-120"/>
+              <a:ea typeface="微軟正黑體" panose="020B0604030504040204" pitchFamily="34" charset="-120"/>
+            </a:endParaRPr>
+          </a:p>
+        </p:txBody>
+      </p:sp>
+      <p:sp>
+        <p:nvSpPr>
+          <p:cNvPr id="201" name="TextBox 200">
+            <a:extLst>
+              <a:ext uri="{FF2B5EF4-FFF2-40B4-BE49-F238E27FC236}">
+                <a16:creationId xmlns:a16="http://schemas.microsoft.com/office/drawing/2014/main" id="{2C7981BB-9AE0-8362-30A1-A6AC0E53181A}"/>
+              </a:ext>
+            </a:extLst>
+          </p:cNvPr>
+          <p:cNvSpPr txBox="1"/>
+          <p:nvPr/>
+        </p:nvSpPr>
+        <p:spPr>
+          <a:xfrm>
+            <a:off x="3959737" y="9534387"/>
+            <a:ext cx="1386600" cy="338554"/>
+          </a:xfrm>
+          <a:prstGeom prst="rect">
+            <a:avLst/>
+          </a:prstGeom>
+          <a:noFill/>
+          <a:ln w="28575">
+            <a:solidFill>
+              <a:schemeClr val="tx1">
+                <a:lumMod val="95000"/>
+                <a:lumOff val="5000"/>
+              </a:schemeClr>
+            </a:solidFill>
+          </a:ln>
+        </p:spPr>
+        <p:txBody>
+          <a:bodyPr wrap="square" rtlCol="0">
+            <a:spAutoFit/>
+          </a:bodyPr>
+          <a:lstStyle/>
+          <a:p>
+            <a:r>
+              <a:rPr lang="en-US" altLang="zh-TW" sz="1600" b="1" dirty="0">
+                <a:latin typeface="微軟正黑體" panose="020B0604030504040204" pitchFamily="34" charset="-120"/>
+                <a:ea typeface="微軟正黑體" panose="020B0604030504040204" pitchFamily="34" charset="-120"/>
+              </a:rPr>
+              <a:t>Denosumab</a:t>
+            </a:r>
+            <a:endParaRPr lang="zh-TW" altLang="en-US" sz="1600" b="1" dirty="0">
+              <a:latin typeface="微軟正黑體" panose="020B0604030504040204" pitchFamily="34" charset="-120"/>
+              <a:ea typeface="微軟正黑體" panose="020B0604030504040204" pitchFamily="34" charset="-120"/>
+            </a:endParaRPr>
+          </a:p>
+        </p:txBody>
+      </p:sp>
+      <p:sp>
+        <p:nvSpPr>
+          <p:cNvPr id="202" name="TextBox 201">
+            <a:extLst>
+              <a:ext uri="{FF2B5EF4-FFF2-40B4-BE49-F238E27FC236}">
+                <a16:creationId xmlns:a16="http://schemas.microsoft.com/office/drawing/2014/main" id="{0BA24FC6-1A4B-7B99-9D33-9B9F05EC5B8B}"/>
+              </a:ext>
+            </a:extLst>
+          </p:cNvPr>
+          <p:cNvSpPr txBox="1"/>
+          <p:nvPr/>
+        </p:nvSpPr>
+        <p:spPr>
+          <a:xfrm>
+            <a:off x="3442284" y="6814478"/>
+            <a:ext cx="1871840" cy="369332"/>
+          </a:xfrm>
+          <a:prstGeom prst="rect">
+            <a:avLst/>
+          </a:prstGeom>
+          <a:noFill/>
+          <a:ln w="28575">
+            <a:solidFill>
+              <a:schemeClr val="tx1">
+                <a:lumMod val="95000"/>
+                <a:lumOff val="5000"/>
+              </a:schemeClr>
+            </a:solidFill>
+          </a:ln>
+        </p:spPr>
+        <p:txBody>
+          <a:bodyPr wrap="square" rtlCol="0">
+            <a:spAutoFit/>
+          </a:bodyPr>
+          <a:lstStyle/>
+          <a:p>
+            <a:r>
+              <a:rPr lang="en-US" altLang="zh-TW" b="1" dirty="0">
+                <a:latin typeface="微軟正黑體" panose="020B0604030504040204" pitchFamily="34" charset="-120"/>
+                <a:ea typeface="微軟正黑體" panose="020B0604030504040204" pitchFamily="34" charset="-120"/>
+              </a:rPr>
+              <a:t>No Medication</a:t>
+            </a:r>
+            <a:endParaRPr lang="zh-TW" altLang="en-US" b="1" dirty="0">
+              <a:latin typeface="微軟正黑體" panose="020B0604030504040204" pitchFamily="34" charset="-120"/>
+              <a:ea typeface="微軟正黑體" panose="020B0604030504040204" pitchFamily="34" charset="-120"/>
+            </a:endParaRPr>
+          </a:p>
+        </p:txBody>
+      </p:sp>
+      <p:sp>
+        <p:nvSpPr>
+          <p:cNvPr id="203" name="TextBox 202">
+            <a:extLst>
+              <a:ext uri="{FF2B5EF4-FFF2-40B4-BE49-F238E27FC236}">
+                <a16:creationId xmlns:a16="http://schemas.microsoft.com/office/drawing/2014/main" id="{F957A673-DC0C-09C3-98CF-F5B9976E96BD}"/>
+              </a:ext>
+            </a:extLst>
+          </p:cNvPr>
+          <p:cNvSpPr txBox="1"/>
+          <p:nvPr/>
+        </p:nvSpPr>
+        <p:spPr>
+          <a:xfrm>
+            <a:off x="3442284" y="7798526"/>
+            <a:ext cx="1680293" cy="369332"/>
+          </a:xfrm>
+          <a:prstGeom prst="rect">
+            <a:avLst/>
+          </a:prstGeom>
+          <a:noFill/>
+          <a:ln w="28575">
+            <a:solidFill>
+              <a:schemeClr val="tx1">
+                <a:lumMod val="95000"/>
+                <a:lumOff val="5000"/>
+              </a:schemeClr>
+            </a:solidFill>
+          </a:ln>
+        </p:spPr>
+        <p:txBody>
+          <a:bodyPr wrap="square" rtlCol="0">
+            <a:spAutoFit/>
+          </a:bodyPr>
+          <a:lstStyle/>
+          <a:p>
+            <a:r>
+              <a:rPr lang="en-US" altLang="zh-TW" b="1" dirty="0">
+                <a:latin typeface="微軟正黑體" panose="020B0604030504040204" pitchFamily="34" charset="-120"/>
+                <a:ea typeface="微軟正黑體" panose="020B0604030504040204" pitchFamily="34" charset="-120"/>
+              </a:rPr>
+              <a:t>Medication</a:t>
+            </a:r>
+            <a:endParaRPr lang="zh-TW" altLang="en-US" b="1" dirty="0">
+              <a:latin typeface="微軟正黑體" panose="020B0604030504040204" pitchFamily="34" charset="-120"/>
+              <a:ea typeface="微軟正黑體" panose="020B0604030504040204" pitchFamily="34" charset="-120"/>
+            </a:endParaRPr>
+          </a:p>
+        </p:txBody>
+      </p:sp>
+      <p:sp>
+        <p:nvSpPr>
+          <p:cNvPr id="204" name="TextBox 203">
+            <a:extLst>
+              <a:ext uri="{FF2B5EF4-FFF2-40B4-BE49-F238E27FC236}">
+                <a16:creationId xmlns:a16="http://schemas.microsoft.com/office/drawing/2014/main" id="{4999BE1E-51A6-77FA-23BC-D3C87F4E838A}"/>
+              </a:ext>
+            </a:extLst>
+          </p:cNvPr>
+          <p:cNvSpPr txBox="1"/>
+          <p:nvPr/>
+        </p:nvSpPr>
+        <p:spPr>
+          <a:xfrm>
+            <a:off x="6984190" y="7664362"/>
+            <a:ext cx="2415474" cy="646331"/>
+          </a:xfrm>
+          <a:prstGeom prst="rect">
+            <a:avLst/>
+          </a:prstGeom>
+          <a:noFill/>
+          <a:ln w="28575">
+            <a:solidFill>
+              <a:schemeClr val="tx1">
+                <a:lumMod val="95000"/>
+                <a:lumOff val="5000"/>
+              </a:schemeClr>
+            </a:solidFill>
+          </a:ln>
+        </p:spPr>
+        <p:txBody>
+          <a:bodyPr wrap="square" rtlCol="0">
+            <a:spAutoFit/>
+          </a:bodyPr>
+          <a:lstStyle/>
+          <a:p>
+            <a:r>
+              <a:rPr lang="en-US" altLang="zh-TW" b="1" dirty="0">
+                <a:latin typeface="微軟正黑體" panose="020B0604030504040204" pitchFamily="34" charset="-120"/>
+                <a:ea typeface="微軟正黑體" panose="020B0604030504040204" pitchFamily="34" charset="-120"/>
+              </a:rPr>
+              <a:t>Medication +</a:t>
+            </a:r>
+          </a:p>
+          <a:p>
+            <a:r>
+              <a:rPr lang="en-US" altLang="zh-TW" b="1" dirty="0">
+                <a:latin typeface="微軟正黑體" panose="020B0604030504040204" pitchFamily="34" charset="-120"/>
+                <a:ea typeface="微軟正黑體" panose="020B0604030504040204" pitchFamily="34" charset="-120"/>
+              </a:rPr>
+              <a:t>Invasive Dental Tx</a:t>
+            </a:r>
+            <a:endParaRPr lang="zh-TW" altLang="en-US" b="1" dirty="0">
+              <a:latin typeface="微軟正黑體" panose="020B0604030504040204" pitchFamily="34" charset="-120"/>
+              <a:ea typeface="微軟正黑體" panose="020B0604030504040204" pitchFamily="34" charset="-120"/>
+            </a:endParaRPr>
+          </a:p>
+        </p:txBody>
+      </p:sp>
+      <p:cxnSp>
+        <p:nvCxnSpPr>
+          <p:cNvPr id="205" name="Straight Connector 204">
+            <a:extLst>
+              <a:ext uri="{FF2B5EF4-FFF2-40B4-BE49-F238E27FC236}">
+                <a16:creationId xmlns:a16="http://schemas.microsoft.com/office/drawing/2014/main" id="{FBC14A4C-0D8D-8599-7C1A-6438CAEC1087}"/>
+              </a:ext>
+            </a:extLst>
+          </p:cNvPr>
+          <p:cNvCxnSpPr>
+            <a:cxnSpLocks/>
+            <a:endCxn id="202" idx="1"/>
+          </p:cNvCxnSpPr>
+          <p:nvPr/>
+        </p:nvCxnSpPr>
+        <p:spPr>
+          <a:xfrm>
+            <a:off x="3241338" y="6999144"/>
+            <a:ext cx="200946" cy="0"/>
+          </a:xfrm>
+          <a:prstGeom prst="line">
+            <a:avLst/>
+          </a:prstGeom>
+          <a:ln w="38100">
+            <a:solidFill>
+              <a:schemeClr val="tx1"/>
+            </a:solidFill>
+          </a:ln>
+        </p:spPr>
+        <p:style>
+          <a:lnRef idx="2">
+            <a:schemeClr val="accent1"/>
+          </a:lnRef>
+          <a:fillRef idx="0">
+            <a:schemeClr val="accent1"/>
+          </a:fillRef>
+          <a:effectRef idx="1">
+            <a:schemeClr val="accent1"/>
+          </a:effectRef>
+          <a:fontRef idx="minor">
+            <a:schemeClr val="tx1"/>
+          </a:fontRef>
+        </p:style>
+      </p:cxnSp>
+      <p:cxnSp>
+        <p:nvCxnSpPr>
+          <p:cNvPr id="206" name="Straight Connector 205">
+            <a:extLst>
+              <a:ext uri="{FF2B5EF4-FFF2-40B4-BE49-F238E27FC236}">
+                <a16:creationId xmlns:a16="http://schemas.microsoft.com/office/drawing/2014/main" id="{90514601-2987-E38A-8D7B-21683348EFA5}"/>
+              </a:ext>
+            </a:extLst>
+          </p:cNvPr>
+          <p:cNvCxnSpPr>
+            <a:cxnSpLocks/>
+            <a:endCxn id="203" idx="1"/>
+          </p:cNvCxnSpPr>
+          <p:nvPr/>
+        </p:nvCxnSpPr>
+        <p:spPr>
+          <a:xfrm>
+            <a:off x="3232087" y="7983192"/>
+            <a:ext cx="210197" cy="0"/>
+          </a:xfrm>
+          <a:prstGeom prst="line">
+            <a:avLst/>
+          </a:prstGeom>
+          <a:ln w="38100">
+            <a:solidFill>
+              <a:schemeClr val="tx1"/>
+            </a:solidFill>
+          </a:ln>
+        </p:spPr>
+        <p:style>
+          <a:lnRef idx="2">
+            <a:schemeClr val="accent1"/>
+          </a:lnRef>
+          <a:fillRef idx="0">
+            <a:schemeClr val="accent1"/>
+          </a:fillRef>
+          <a:effectRef idx="1">
+            <a:schemeClr val="accent1"/>
+          </a:effectRef>
+          <a:fontRef idx="minor">
+            <a:schemeClr val="tx1"/>
+          </a:fontRef>
+        </p:style>
+      </p:cxnSp>
+      <p:cxnSp>
+        <p:nvCxnSpPr>
+          <p:cNvPr id="207" name="Straight Connector 206">
+            <a:extLst>
+              <a:ext uri="{FF2B5EF4-FFF2-40B4-BE49-F238E27FC236}">
+                <a16:creationId xmlns:a16="http://schemas.microsoft.com/office/drawing/2014/main" id="{47F1E193-3B9D-D281-6A0C-442CD46E42D1}"/>
+              </a:ext>
+            </a:extLst>
+          </p:cNvPr>
+          <p:cNvCxnSpPr>
+            <a:cxnSpLocks/>
+          </p:cNvCxnSpPr>
+          <p:nvPr/>
+        </p:nvCxnSpPr>
+        <p:spPr>
+          <a:xfrm>
+            <a:off x="3248770" y="6999144"/>
+            <a:ext cx="0" cy="988382"/>
+          </a:xfrm>
+          <a:prstGeom prst="line">
+            <a:avLst/>
+          </a:prstGeom>
+          <a:ln w="38100">
+            <a:solidFill>
+              <a:schemeClr val="tx1"/>
+            </a:solidFill>
+          </a:ln>
+        </p:spPr>
+        <p:style>
+          <a:lnRef idx="2">
+            <a:schemeClr val="accent1"/>
+          </a:lnRef>
+          <a:fillRef idx="0">
+            <a:schemeClr val="accent1"/>
+          </a:fillRef>
+          <a:effectRef idx="1">
+            <a:schemeClr val="accent1"/>
+          </a:effectRef>
+          <a:fontRef idx="minor">
+            <a:schemeClr val="tx1"/>
+          </a:fontRef>
+        </p:style>
+      </p:cxnSp>
+      <p:cxnSp>
+        <p:nvCxnSpPr>
+          <p:cNvPr id="208" name="Straight Connector 207">
+            <a:extLst>
+              <a:ext uri="{FF2B5EF4-FFF2-40B4-BE49-F238E27FC236}">
+                <a16:creationId xmlns:a16="http://schemas.microsoft.com/office/drawing/2014/main" id="{6D7480CD-6CDA-D2B6-A737-97F773BC2449}"/>
+              </a:ext>
+            </a:extLst>
+          </p:cNvPr>
+          <p:cNvCxnSpPr>
+            <a:cxnSpLocks/>
+            <a:stCxn id="203" idx="3"/>
+            <a:endCxn id="204" idx="1"/>
+          </p:cNvCxnSpPr>
+          <p:nvPr/>
+        </p:nvCxnSpPr>
+        <p:spPr>
+          <a:xfrm>
+            <a:off x="5122577" y="7983192"/>
+            <a:ext cx="1861613" cy="4336"/>
+          </a:xfrm>
+          <a:prstGeom prst="line">
+            <a:avLst/>
+          </a:prstGeom>
+          <a:ln w="38100">
+            <a:solidFill>
+              <a:schemeClr val="tx1"/>
+            </a:solidFill>
+          </a:ln>
+        </p:spPr>
+        <p:style>
+          <a:lnRef idx="2">
+            <a:schemeClr val="accent1"/>
+          </a:lnRef>
+          <a:fillRef idx="0">
+            <a:schemeClr val="accent1"/>
+          </a:fillRef>
+          <a:effectRef idx="1">
+            <a:schemeClr val="accent1"/>
+          </a:effectRef>
+          <a:fontRef idx="minor">
+            <a:schemeClr val="tx1"/>
+          </a:fontRef>
+        </p:style>
+      </p:cxnSp>
+      <p:cxnSp>
+        <p:nvCxnSpPr>
+          <p:cNvPr id="209" name="Straight Connector 208">
+            <a:extLst>
+              <a:ext uri="{FF2B5EF4-FFF2-40B4-BE49-F238E27FC236}">
+                <a16:creationId xmlns:a16="http://schemas.microsoft.com/office/drawing/2014/main" id="{E94BE5A9-2E5B-30BA-C223-354EFA240EF8}"/>
+              </a:ext>
+            </a:extLst>
+          </p:cNvPr>
+          <p:cNvCxnSpPr>
+            <a:cxnSpLocks/>
+          </p:cNvCxnSpPr>
+          <p:nvPr/>
+        </p:nvCxnSpPr>
+        <p:spPr>
+          <a:xfrm>
+            <a:off x="3646230" y="8183020"/>
+            <a:ext cx="0" cy="1520644"/>
+          </a:xfrm>
+          <a:prstGeom prst="line">
+            <a:avLst/>
+          </a:prstGeom>
+          <a:ln w="38100">
+            <a:solidFill>
+              <a:schemeClr val="tx1"/>
+            </a:solidFill>
+          </a:ln>
+        </p:spPr>
+        <p:style>
+          <a:lnRef idx="2">
+            <a:schemeClr val="accent1"/>
+          </a:lnRef>
+          <a:fillRef idx="0">
+            <a:schemeClr val="accent1"/>
+          </a:fillRef>
+          <a:effectRef idx="1">
+            <a:schemeClr val="accent1"/>
+          </a:effectRef>
+          <a:fontRef idx="minor">
+            <a:schemeClr val="tx1"/>
+          </a:fontRef>
+        </p:style>
+      </p:cxnSp>
+      <p:cxnSp>
+        <p:nvCxnSpPr>
+          <p:cNvPr id="210" name="Straight Connector 209">
+            <a:extLst>
+              <a:ext uri="{FF2B5EF4-FFF2-40B4-BE49-F238E27FC236}">
+                <a16:creationId xmlns:a16="http://schemas.microsoft.com/office/drawing/2014/main" id="{812713BB-D598-238E-6697-C57FC8F53FA5}"/>
+              </a:ext>
+            </a:extLst>
+          </p:cNvPr>
+          <p:cNvCxnSpPr>
+            <a:cxnSpLocks/>
+            <a:endCxn id="200" idx="1"/>
+          </p:cNvCxnSpPr>
+          <p:nvPr/>
+        </p:nvCxnSpPr>
+        <p:spPr>
+          <a:xfrm>
+            <a:off x="3629791" y="8898080"/>
+            <a:ext cx="325914" cy="0"/>
+          </a:xfrm>
+          <a:prstGeom prst="line">
+            <a:avLst/>
+          </a:prstGeom>
+          <a:ln w="38100">
+            <a:solidFill>
+              <a:schemeClr val="tx1"/>
+            </a:solidFill>
+          </a:ln>
+        </p:spPr>
+        <p:style>
+          <a:lnRef idx="2">
+            <a:schemeClr val="accent1"/>
+          </a:lnRef>
+          <a:fillRef idx="0">
+            <a:schemeClr val="accent1"/>
+          </a:fillRef>
+          <a:effectRef idx="1">
+            <a:schemeClr val="accent1"/>
+          </a:effectRef>
+          <a:fontRef idx="minor">
+            <a:schemeClr val="tx1"/>
+          </a:fontRef>
+        </p:style>
+      </p:cxnSp>
+      <p:cxnSp>
+        <p:nvCxnSpPr>
+          <p:cNvPr id="211" name="Straight Connector 210">
+            <a:extLst>
+              <a:ext uri="{FF2B5EF4-FFF2-40B4-BE49-F238E27FC236}">
+                <a16:creationId xmlns:a16="http://schemas.microsoft.com/office/drawing/2014/main" id="{EADEC05E-3641-16AE-8C3B-CD1D0E0FC13B}"/>
+              </a:ext>
+            </a:extLst>
+          </p:cNvPr>
+          <p:cNvCxnSpPr>
+            <a:cxnSpLocks/>
+            <a:endCxn id="201" idx="1"/>
+          </p:cNvCxnSpPr>
+          <p:nvPr/>
+        </p:nvCxnSpPr>
+        <p:spPr>
+          <a:xfrm>
+            <a:off x="3629320" y="9703664"/>
+            <a:ext cx="330417" cy="0"/>
+          </a:xfrm>
+          <a:prstGeom prst="line">
+            <a:avLst/>
+          </a:prstGeom>
+          <a:ln w="38100">
+            <a:solidFill>
+              <a:schemeClr val="tx1"/>
+            </a:solidFill>
+          </a:ln>
+        </p:spPr>
+        <p:style>
+          <a:lnRef idx="2">
+            <a:schemeClr val="accent1"/>
+          </a:lnRef>
+          <a:fillRef idx="0">
+            <a:schemeClr val="accent1"/>
+          </a:fillRef>
+          <a:effectRef idx="1">
+            <a:schemeClr val="accent1"/>
+          </a:effectRef>
+          <a:fontRef idx="minor">
+            <a:schemeClr val="tx1"/>
+          </a:fontRef>
+        </p:style>
+      </p:cxnSp>
+      <p:sp>
+        <p:nvSpPr>
+          <p:cNvPr id="219" name="TextBox 218">
+            <a:extLst>
+              <a:ext uri="{FF2B5EF4-FFF2-40B4-BE49-F238E27FC236}">
+                <a16:creationId xmlns:a16="http://schemas.microsoft.com/office/drawing/2014/main" id="{8AE06034-C69B-5674-BD00-AF293485A4D5}"/>
+              </a:ext>
+            </a:extLst>
+          </p:cNvPr>
+          <p:cNvSpPr txBox="1"/>
+          <p:nvPr/>
+        </p:nvSpPr>
+        <p:spPr>
+          <a:xfrm>
+            <a:off x="7667160" y="8731148"/>
+            <a:ext cx="1808974" cy="338554"/>
+          </a:xfrm>
+          <a:prstGeom prst="rect">
+            <a:avLst/>
+          </a:prstGeom>
+          <a:noFill/>
+          <a:ln w="28575">
+            <a:solidFill>
+              <a:schemeClr val="tx1">
+                <a:lumMod val="95000"/>
+                <a:lumOff val="5000"/>
+              </a:schemeClr>
+            </a:solidFill>
+          </a:ln>
+        </p:spPr>
+        <p:txBody>
+          <a:bodyPr wrap="square" rtlCol="0">
+            <a:spAutoFit/>
+          </a:bodyPr>
+          <a:lstStyle/>
+          <a:p>
+            <a:r>
+              <a:rPr lang="en-US" altLang="zh-TW" sz="1600" b="1" dirty="0">
+                <a:latin typeface="微軟正黑體" panose="020B0604030504040204" pitchFamily="34" charset="-120"/>
+                <a:ea typeface="微軟正黑體" panose="020B0604030504040204" pitchFamily="34" charset="-120"/>
+              </a:rPr>
+              <a:t>Bisphosphonate</a:t>
+            </a:r>
+            <a:endParaRPr lang="zh-TW" altLang="en-US" sz="1600" b="1" dirty="0">
+              <a:latin typeface="微軟正黑體" panose="020B0604030504040204" pitchFamily="34" charset="-120"/>
+              <a:ea typeface="微軟正黑體" panose="020B0604030504040204" pitchFamily="34" charset="-120"/>
+            </a:endParaRPr>
+          </a:p>
+        </p:txBody>
+      </p:sp>
+      <p:sp>
+        <p:nvSpPr>
+          <p:cNvPr id="220" name="TextBox 219">
+            <a:extLst>
+              <a:ext uri="{FF2B5EF4-FFF2-40B4-BE49-F238E27FC236}">
+                <a16:creationId xmlns:a16="http://schemas.microsoft.com/office/drawing/2014/main" id="{BF87D1E3-06EF-1D3A-FE8E-490CF4E3C55B}"/>
+              </a:ext>
+            </a:extLst>
+          </p:cNvPr>
+          <p:cNvSpPr txBox="1"/>
+          <p:nvPr/>
+        </p:nvSpPr>
+        <p:spPr>
+          <a:xfrm>
+            <a:off x="7669071" y="9538147"/>
+            <a:ext cx="1386600" cy="338554"/>
+          </a:xfrm>
+          <a:prstGeom prst="rect">
+            <a:avLst/>
+          </a:prstGeom>
+          <a:noFill/>
+          <a:ln w="28575">
+            <a:solidFill>
+              <a:schemeClr val="tx1">
+                <a:lumMod val="95000"/>
+                <a:lumOff val="5000"/>
+              </a:schemeClr>
+            </a:solidFill>
+          </a:ln>
+        </p:spPr>
+        <p:txBody>
+          <a:bodyPr wrap="square" rtlCol="0">
+            <a:spAutoFit/>
+          </a:bodyPr>
+          <a:lstStyle/>
+          <a:p>
+            <a:r>
+              <a:rPr lang="en-US" altLang="zh-TW" sz="1600" b="1" dirty="0">
+                <a:latin typeface="微軟正黑體" panose="020B0604030504040204" pitchFamily="34" charset="-120"/>
+                <a:ea typeface="微軟正黑體" panose="020B0604030504040204" pitchFamily="34" charset="-120"/>
+              </a:rPr>
+              <a:t>Denosumab</a:t>
+            </a:r>
+            <a:endParaRPr lang="zh-TW" altLang="en-US" sz="1600" b="1" dirty="0">
+              <a:latin typeface="微軟正黑體" panose="020B0604030504040204" pitchFamily="34" charset="-120"/>
+              <a:ea typeface="微軟正黑體" panose="020B0604030504040204" pitchFamily="34" charset="-120"/>
+            </a:endParaRPr>
+          </a:p>
+        </p:txBody>
+      </p:sp>
+      <p:cxnSp>
+        <p:nvCxnSpPr>
+          <p:cNvPr id="221" name="Straight Connector 220">
+            <a:extLst>
+              <a:ext uri="{FF2B5EF4-FFF2-40B4-BE49-F238E27FC236}">
+                <a16:creationId xmlns:a16="http://schemas.microsoft.com/office/drawing/2014/main" id="{B0D58CB2-C2C1-032A-D778-32DBB83DB21B}"/>
+              </a:ext>
+            </a:extLst>
+          </p:cNvPr>
+          <p:cNvCxnSpPr>
+            <a:cxnSpLocks/>
+          </p:cNvCxnSpPr>
+          <p:nvPr/>
+        </p:nvCxnSpPr>
+        <p:spPr>
+          <a:xfrm>
+            <a:off x="7355564" y="8310693"/>
+            <a:ext cx="0" cy="1396731"/>
+          </a:xfrm>
+          <a:prstGeom prst="line">
+            <a:avLst/>
+          </a:prstGeom>
+          <a:ln w="38100">
+            <a:solidFill>
+              <a:schemeClr val="tx1"/>
+            </a:solidFill>
+          </a:ln>
+        </p:spPr>
+        <p:style>
+          <a:lnRef idx="2">
+            <a:schemeClr val="accent1"/>
+          </a:lnRef>
+          <a:fillRef idx="0">
+            <a:schemeClr val="accent1"/>
+          </a:fillRef>
+          <a:effectRef idx="1">
+            <a:schemeClr val="accent1"/>
+          </a:effectRef>
+          <a:fontRef idx="minor">
+            <a:schemeClr val="tx1"/>
+          </a:fontRef>
+        </p:style>
+      </p:cxnSp>
+      <p:cxnSp>
+        <p:nvCxnSpPr>
+          <p:cNvPr id="222" name="Straight Connector 221">
+            <a:extLst>
+              <a:ext uri="{FF2B5EF4-FFF2-40B4-BE49-F238E27FC236}">
+                <a16:creationId xmlns:a16="http://schemas.microsoft.com/office/drawing/2014/main" id="{7A33AF53-F015-DEBF-A190-817CFFB8A5D4}"/>
+              </a:ext>
+            </a:extLst>
+          </p:cNvPr>
+          <p:cNvCxnSpPr>
+            <a:cxnSpLocks/>
+            <a:endCxn id="219" idx="1"/>
+          </p:cNvCxnSpPr>
+          <p:nvPr/>
+        </p:nvCxnSpPr>
+        <p:spPr>
+          <a:xfrm>
+            <a:off x="7355564" y="8900424"/>
+            <a:ext cx="311596" cy="1"/>
+          </a:xfrm>
+          <a:prstGeom prst="line">
+            <a:avLst/>
+          </a:prstGeom>
+          <a:ln w="38100">
+            <a:solidFill>
+              <a:schemeClr val="tx1"/>
+            </a:solidFill>
+          </a:ln>
+        </p:spPr>
+        <p:style>
+          <a:lnRef idx="2">
+            <a:schemeClr val="accent1"/>
+          </a:lnRef>
+          <a:fillRef idx="0">
+            <a:schemeClr val="accent1"/>
+          </a:fillRef>
+          <a:effectRef idx="1">
+            <a:schemeClr val="accent1"/>
+          </a:effectRef>
+          <a:fontRef idx="minor">
+            <a:schemeClr val="tx1"/>
+          </a:fontRef>
+        </p:style>
+      </p:cxnSp>
+      <p:cxnSp>
+        <p:nvCxnSpPr>
+          <p:cNvPr id="223" name="Straight Connector 222">
+            <a:extLst>
+              <a:ext uri="{FF2B5EF4-FFF2-40B4-BE49-F238E27FC236}">
+                <a16:creationId xmlns:a16="http://schemas.microsoft.com/office/drawing/2014/main" id="{3DC32848-3B91-9156-8D46-DD1D763907C2}"/>
+              </a:ext>
+            </a:extLst>
+          </p:cNvPr>
+          <p:cNvCxnSpPr>
+            <a:cxnSpLocks/>
+            <a:endCxn id="220" idx="1"/>
+          </p:cNvCxnSpPr>
+          <p:nvPr/>
+        </p:nvCxnSpPr>
+        <p:spPr>
+          <a:xfrm>
+            <a:off x="7357475" y="9707424"/>
+            <a:ext cx="311596" cy="0"/>
+          </a:xfrm>
+          <a:prstGeom prst="line">
+            <a:avLst/>
+          </a:prstGeom>
+          <a:ln w="38100">
+            <a:solidFill>
+              <a:schemeClr val="tx1"/>
+            </a:solidFill>
+          </a:ln>
+        </p:spPr>
+        <p:style>
+          <a:lnRef idx="2">
+            <a:schemeClr val="accent1"/>
+          </a:lnRef>
+          <a:fillRef idx="0">
+            <a:schemeClr val="accent1"/>
+          </a:fillRef>
+          <a:effectRef idx="1">
+            <a:schemeClr val="accent1"/>
+          </a:effectRef>
+          <a:fontRef idx="minor">
+            <a:schemeClr val="tx1"/>
+          </a:fontRef>
+        </p:style>
+      </p:cxnSp>
+      <p:cxnSp>
+        <p:nvCxnSpPr>
+          <p:cNvPr id="231" name="Straight Connector 230">
+            <a:extLst>
+              <a:ext uri="{FF2B5EF4-FFF2-40B4-BE49-F238E27FC236}">
+                <a16:creationId xmlns:a16="http://schemas.microsoft.com/office/drawing/2014/main" id="{54BD3249-9D51-B928-93C1-693E772CC8A6}"/>
+              </a:ext>
+            </a:extLst>
+          </p:cNvPr>
+          <p:cNvCxnSpPr>
+            <a:cxnSpLocks/>
+          </p:cNvCxnSpPr>
+          <p:nvPr/>
+        </p:nvCxnSpPr>
+        <p:spPr>
+          <a:xfrm>
+            <a:off x="3073314" y="7537753"/>
+            <a:ext cx="179356" cy="0"/>
+          </a:xfrm>
+          <a:prstGeom prst="line">
+            <a:avLst/>
+          </a:prstGeom>
+          <a:ln w="38100">
+            <a:solidFill>
+              <a:schemeClr val="tx1"/>
+            </a:solidFill>
+          </a:ln>
+        </p:spPr>
+        <p:style>
+          <a:lnRef idx="2">
+            <a:schemeClr val="accent1"/>
+          </a:lnRef>
+          <a:fillRef idx="0">
+            <a:schemeClr val="accent1"/>
+          </a:fillRef>
+          <a:effectRef idx="1">
+            <a:schemeClr val="accent1"/>
+          </a:effectRef>
+          <a:fontRef idx="minor">
+            <a:schemeClr val="tx1"/>
+          </a:fontRef>
+        </p:style>
+      </p:cxnSp>
+      <p:sp>
+        <p:nvSpPr>
+          <p:cNvPr id="3" name="TextBox 2">
+            <a:extLst>
+              <a:ext uri="{FF2B5EF4-FFF2-40B4-BE49-F238E27FC236}">
+                <a16:creationId xmlns:a16="http://schemas.microsoft.com/office/drawing/2014/main" id="{1B92E2E9-C90A-2CEC-1302-DE06C335CC89}"/>
+              </a:ext>
+            </a:extLst>
+          </p:cNvPr>
+          <p:cNvSpPr txBox="1"/>
+          <p:nvPr/>
+        </p:nvSpPr>
+        <p:spPr>
+          <a:xfrm>
+            <a:off x="3507981" y="235723"/>
+            <a:ext cx="1862589" cy="369332"/>
+          </a:xfrm>
+          <a:prstGeom prst="rect">
+            <a:avLst/>
+          </a:prstGeom>
+          <a:noFill/>
+        </p:spPr>
+        <p:txBody>
+          <a:bodyPr wrap="square" rtlCol="0">
+            <a:spAutoFit/>
+          </a:bodyPr>
+          <a:lstStyle/>
+          <a:p>
+            <a:pPr algn="ctr"/>
+            <a:r>
+              <a:rPr lang="en-US" altLang="zh-TW" b="1" dirty="0"/>
+              <a:t>0.04%</a:t>
+            </a:r>
+            <a:endParaRPr lang="zh-TW" altLang="en-US" b="1" dirty="0"/>
+          </a:p>
+        </p:txBody>
+      </p:sp>
+      <p:sp>
+        <p:nvSpPr>
+          <p:cNvPr id="4" name="TextBox 3">
+            <a:extLst>
+              <a:ext uri="{FF2B5EF4-FFF2-40B4-BE49-F238E27FC236}">
+                <a16:creationId xmlns:a16="http://schemas.microsoft.com/office/drawing/2014/main" id="{74C1FB18-0617-EF65-EA99-ED79B0514460}"/>
+              </a:ext>
+            </a:extLst>
+          </p:cNvPr>
+          <p:cNvSpPr txBox="1"/>
+          <p:nvPr/>
+        </p:nvSpPr>
+        <p:spPr>
+          <a:xfrm>
+            <a:off x="3493456" y="1199089"/>
+            <a:ext cx="1680293" cy="369332"/>
+          </a:xfrm>
+          <a:prstGeom prst="rect">
+            <a:avLst/>
+          </a:prstGeom>
+          <a:noFill/>
+        </p:spPr>
+        <p:txBody>
+          <a:bodyPr wrap="square" rtlCol="0">
+            <a:spAutoFit/>
+          </a:bodyPr>
+          <a:lstStyle/>
+          <a:p>
+            <a:pPr algn="ctr"/>
+            <a:r>
+              <a:rPr lang="en-US" altLang="zh-TW" b="1" dirty="0"/>
+              <a:t>0.20%</a:t>
+            </a:r>
+            <a:endParaRPr lang="zh-TW" altLang="en-US" b="1" dirty="0"/>
+          </a:p>
+        </p:txBody>
+      </p:sp>
+      <p:sp>
+        <p:nvSpPr>
+          <p:cNvPr id="7" name="TextBox 6">
+            <a:extLst>
+              <a:ext uri="{FF2B5EF4-FFF2-40B4-BE49-F238E27FC236}">
+                <a16:creationId xmlns:a16="http://schemas.microsoft.com/office/drawing/2014/main" id="{8F83CD66-A7E4-59DF-8D69-BB2F8ED04580}"/>
+              </a:ext>
+            </a:extLst>
+          </p:cNvPr>
+          <p:cNvSpPr txBox="1"/>
+          <p:nvPr/>
+        </p:nvSpPr>
+        <p:spPr>
+          <a:xfrm>
+            <a:off x="7040636" y="1071647"/>
+            <a:ext cx="2415471" cy="369332"/>
+          </a:xfrm>
+          <a:prstGeom prst="rect">
+            <a:avLst/>
+          </a:prstGeom>
+          <a:noFill/>
+        </p:spPr>
+        <p:txBody>
+          <a:bodyPr wrap="square" rtlCol="0">
+            <a:spAutoFit/>
+          </a:bodyPr>
+          <a:lstStyle/>
+          <a:p>
+            <a:pPr algn="ctr"/>
+            <a:r>
+              <a:rPr lang="en-US" altLang="zh-TW" b="1" dirty="0"/>
+              <a:t>1.48%</a:t>
+            </a:r>
+            <a:endParaRPr lang="zh-TW" altLang="en-US" b="1" dirty="0"/>
+          </a:p>
+        </p:txBody>
+      </p:sp>
+      <p:sp>
+        <p:nvSpPr>
+          <p:cNvPr id="8" name="TextBox 7">
+            <a:extLst>
+              <a:ext uri="{FF2B5EF4-FFF2-40B4-BE49-F238E27FC236}">
+                <a16:creationId xmlns:a16="http://schemas.microsoft.com/office/drawing/2014/main" id="{8FDC564E-234A-06FD-C9D9-C2DEC85F60A7}"/>
+              </a:ext>
+            </a:extLst>
+          </p:cNvPr>
+          <p:cNvSpPr txBox="1"/>
+          <p:nvPr/>
+        </p:nvSpPr>
+        <p:spPr>
+          <a:xfrm>
+            <a:off x="4694601" y="2817141"/>
+            <a:ext cx="2376511" cy="369332"/>
+          </a:xfrm>
+          <a:prstGeom prst="rect">
+            <a:avLst/>
+          </a:prstGeom>
+          <a:noFill/>
+        </p:spPr>
+        <p:txBody>
+          <a:bodyPr wrap="square" rtlCol="0">
+            <a:spAutoFit/>
+          </a:bodyPr>
+          <a:lstStyle/>
+          <a:p>
+            <a:pPr algn="ctr"/>
+            <a:r>
+              <a:rPr lang="en-US" altLang="zh-TW" b="1" dirty="0"/>
+              <a:t>0.21%</a:t>
+            </a:r>
+            <a:endParaRPr lang="zh-TW" altLang="en-US" b="1" dirty="0"/>
+          </a:p>
+        </p:txBody>
+      </p:sp>
+      <p:sp>
+        <p:nvSpPr>
+          <p:cNvPr id="9" name="TextBox 8">
+            <a:extLst>
+              <a:ext uri="{FF2B5EF4-FFF2-40B4-BE49-F238E27FC236}">
+                <a16:creationId xmlns:a16="http://schemas.microsoft.com/office/drawing/2014/main" id="{582B091C-9B7A-6E9E-6E65-5680285AA674}"/>
+              </a:ext>
+            </a:extLst>
+          </p:cNvPr>
+          <p:cNvSpPr txBox="1"/>
+          <p:nvPr/>
+        </p:nvSpPr>
+        <p:spPr>
+          <a:xfrm>
+            <a:off x="4015422" y="2064993"/>
+            <a:ext cx="1798412" cy="369332"/>
+          </a:xfrm>
+          <a:prstGeom prst="rect">
+            <a:avLst/>
+          </a:prstGeom>
+          <a:noFill/>
+        </p:spPr>
+        <p:txBody>
+          <a:bodyPr wrap="square" rtlCol="0">
+            <a:spAutoFit/>
+          </a:bodyPr>
+          <a:lstStyle/>
+          <a:p>
+            <a:pPr algn="ctr"/>
+            <a:r>
+              <a:rPr lang="en-US" altLang="zh-TW" b="1" dirty="0"/>
+              <a:t>0.21%</a:t>
+            </a:r>
+            <a:endParaRPr lang="zh-TW" altLang="en-US" b="1" dirty="0"/>
+          </a:p>
+        </p:txBody>
+      </p:sp>
+      <p:sp>
+        <p:nvSpPr>
+          <p:cNvPr id="10" name="TextBox 9">
+            <a:extLst>
+              <a:ext uri="{FF2B5EF4-FFF2-40B4-BE49-F238E27FC236}">
+                <a16:creationId xmlns:a16="http://schemas.microsoft.com/office/drawing/2014/main" id="{86ED8A6D-C3B5-EBFD-E4A0-19219BA74A03}"/>
+              </a:ext>
+            </a:extLst>
+          </p:cNvPr>
+          <p:cNvSpPr txBox="1"/>
+          <p:nvPr/>
+        </p:nvSpPr>
+        <p:spPr>
+          <a:xfrm>
+            <a:off x="4694601" y="3518245"/>
+            <a:ext cx="2376511" cy="369332"/>
+          </a:xfrm>
+          <a:prstGeom prst="rect">
+            <a:avLst/>
+          </a:prstGeom>
+          <a:noFill/>
+        </p:spPr>
+        <p:txBody>
+          <a:bodyPr wrap="square" rtlCol="0">
+            <a:spAutoFit/>
+          </a:bodyPr>
+          <a:lstStyle/>
+          <a:p>
+            <a:pPr algn="ctr"/>
+            <a:r>
+              <a:rPr lang="en-US" altLang="zh-TW" b="1" dirty="0"/>
+              <a:t>0.24%</a:t>
+            </a:r>
+            <a:endParaRPr lang="zh-TW" altLang="en-US" b="1" dirty="0"/>
+          </a:p>
+        </p:txBody>
+      </p:sp>
+      <p:sp>
+        <p:nvSpPr>
+          <p:cNvPr id="11" name="TextBox 10">
+            <a:extLst>
+              <a:ext uri="{FF2B5EF4-FFF2-40B4-BE49-F238E27FC236}">
+                <a16:creationId xmlns:a16="http://schemas.microsoft.com/office/drawing/2014/main" id="{F09DFDAA-5780-FC2B-54AB-AC6AA7A7979C}"/>
+              </a:ext>
+            </a:extLst>
+          </p:cNvPr>
+          <p:cNvSpPr txBox="1"/>
+          <p:nvPr/>
+        </p:nvSpPr>
+        <p:spPr>
+          <a:xfrm>
+            <a:off x="4089401" y="5219433"/>
+            <a:ext cx="1714563" cy="369332"/>
+          </a:xfrm>
+          <a:prstGeom prst="rect">
+            <a:avLst/>
+          </a:prstGeom>
+          <a:noFill/>
+        </p:spPr>
+        <p:txBody>
+          <a:bodyPr wrap="square" rtlCol="0">
+            <a:spAutoFit/>
+          </a:bodyPr>
+          <a:lstStyle/>
+          <a:p>
+            <a:pPr algn="ctr"/>
+            <a:r>
+              <a:rPr lang="en-US" altLang="zh-TW" b="1" dirty="0"/>
+              <a:t>0.04%</a:t>
+            </a:r>
+            <a:r>
+              <a:rPr lang="zh-TW" altLang="en-US" b="1" dirty="0"/>
+              <a:t> **</a:t>
+            </a:r>
+          </a:p>
+        </p:txBody>
+      </p:sp>
+      <p:sp>
+        <p:nvSpPr>
+          <p:cNvPr id="12" name="TextBox 11">
+            <a:extLst>
+              <a:ext uri="{FF2B5EF4-FFF2-40B4-BE49-F238E27FC236}">
+                <a16:creationId xmlns:a16="http://schemas.microsoft.com/office/drawing/2014/main" id="{84B84F7D-7033-4632-59B7-6594BAF83B66}"/>
+              </a:ext>
+            </a:extLst>
+          </p:cNvPr>
+          <p:cNvSpPr txBox="1"/>
+          <p:nvPr/>
+        </p:nvSpPr>
+        <p:spPr>
+          <a:xfrm>
+            <a:off x="4025965" y="4416722"/>
+            <a:ext cx="1391756" cy="369332"/>
+          </a:xfrm>
+          <a:prstGeom prst="rect">
+            <a:avLst/>
+          </a:prstGeom>
+          <a:noFill/>
+        </p:spPr>
+        <p:txBody>
+          <a:bodyPr wrap="square" rtlCol="0">
+            <a:spAutoFit/>
+          </a:bodyPr>
+          <a:lstStyle/>
+          <a:p>
+            <a:pPr algn="ctr"/>
+            <a:r>
+              <a:rPr lang="en-US" altLang="zh-TW" b="1" dirty="0"/>
+              <a:t>0.04%</a:t>
+            </a:r>
+            <a:r>
+              <a:rPr lang="zh-TW" altLang="en-US" b="1" dirty="0"/>
+              <a:t> **</a:t>
+            </a:r>
+          </a:p>
+        </p:txBody>
+      </p:sp>
+      <p:sp>
+        <p:nvSpPr>
+          <p:cNvPr id="15" name="TextBox 14">
+            <a:extLst>
+              <a:ext uri="{FF2B5EF4-FFF2-40B4-BE49-F238E27FC236}">
+                <a16:creationId xmlns:a16="http://schemas.microsoft.com/office/drawing/2014/main" id="{DF23460D-9B34-4C18-3796-38D200B2C784}"/>
+              </a:ext>
+            </a:extLst>
+          </p:cNvPr>
+          <p:cNvSpPr txBox="1"/>
+          <p:nvPr/>
+        </p:nvSpPr>
+        <p:spPr>
+          <a:xfrm>
+            <a:off x="7698867" y="2237803"/>
+            <a:ext cx="1808974" cy="369332"/>
+          </a:xfrm>
+          <a:prstGeom prst="rect">
+            <a:avLst/>
+          </a:prstGeom>
+          <a:noFill/>
+        </p:spPr>
+        <p:txBody>
+          <a:bodyPr wrap="square" rtlCol="0">
+            <a:spAutoFit/>
+          </a:bodyPr>
+          <a:lstStyle/>
+          <a:p>
+            <a:pPr algn="ctr"/>
+            <a:r>
+              <a:rPr lang="en-US" altLang="zh-TW" b="1" dirty="0"/>
+              <a:t>2.5%</a:t>
+            </a:r>
+            <a:endParaRPr lang="zh-TW" altLang="en-US" b="1" dirty="0"/>
+          </a:p>
+        </p:txBody>
+      </p:sp>
+      <p:sp>
+        <p:nvSpPr>
+          <p:cNvPr id="16" name="TextBox 15">
+            <a:extLst>
+              <a:ext uri="{FF2B5EF4-FFF2-40B4-BE49-F238E27FC236}">
+                <a16:creationId xmlns:a16="http://schemas.microsoft.com/office/drawing/2014/main" id="{7926E66B-5C77-17FA-185E-33837B4E9C92}"/>
+              </a:ext>
+            </a:extLst>
+          </p:cNvPr>
+          <p:cNvSpPr txBox="1"/>
+          <p:nvPr/>
+        </p:nvSpPr>
+        <p:spPr>
+          <a:xfrm>
+            <a:off x="8201386" y="3733297"/>
+            <a:ext cx="2393887" cy="369332"/>
+          </a:xfrm>
+          <a:prstGeom prst="rect">
+            <a:avLst/>
+          </a:prstGeom>
+          <a:noFill/>
+        </p:spPr>
+        <p:txBody>
+          <a:bodyPr wrap="square" rtlCol="0">
+            <a:spAutoFit/>
+          </a:bodyPr>
+          <a:lstStyle/>
+          <a:p>
+            <a:pPr algn="ctr"/>
+            <a:r>
+              <a:rPr lang="en-US" altLang="zh-TW" b="1" dirty="0"/>
+              <a:t>15.12%</a:t>
+            </a:r>
+            <a:r>
+              <a:rPr lang="zh-TW" altLang="en-US" b="1" dirty="0"/>
+              <a:t> **</a:t>
+            </a:r>
+          </a:p>
+        </p:txBody>
+      </p:sp>
+      <p:sp>
+        <p:nvSpPr>
+          <p:cNvPr id="17" name="TextBox 16">
+            <a:extLst>
+              <a:ext uri="{FF2B5EF4-FFF2-40B4-BE49-F238E27FC236}">
+                <a16:creationId xmlns:a16="http://schemas.microsoft.com/office/drawing/2014/main" id="{AB7ECA3A-5E46-754A-A259-BE9E55034044}"/>
+              </a:ext>
+            </a:extLst>
+          </p:cNvPr>
+          <p:cNvSpPr txBox="1"/>
+          <p:nvPr/>
+        </p:nvSpPr>
+        <p:spPr>
+          <a:xfrm>
+            <a:off x="8201386" y="2967608"/>
+            <a:ext cx="2393891" cy="369332"/>
+          </a:xfrm>
+          <a:prstGeom prst="rect">
+            <a:avLst/>
+          </a:prstGeom>
+          <a:noFill/>
+        </p:spPr>
+        <p:txBody>
+          <a:bodyPr wrap="square" rtlCol="0">
+            <a:spAutoFit/>
+          </a:bodyPr>
+          <a:lstStyle/>
+          <a:p>
+            <a:pPr algn="ctr"/>
+            <a:r>
+              <a:rPr lang="en-US" altLang="zh-TW" b="1" dirty="0"/>
+              <a:t>1.61%</a:t>
+            </a:r>
+            <a:endParaRPr lang="zh-TW" altLang="en-US" b="1" dirty="0"/>
+          </a:p>
+        </p:txBody>
+      </p:sp>
+      <p:sp>
+        <p:nvSpPr>
+          <p:cNvPr id="22" name="TextBox 21">
+            <a:extLst>
+              <a:ext uri="{FF2B5EF4-FFF2-40B4-BE49-F238E27FC236}">
+                <a16:creationId xmlns:a16="http://schemas.microsoft.com/office/drawing/2014/main" id="{F8267BB7-1895-9D66-2A0E-FFF2CEA648B6}"/>
+              </a:ext>
+            </a:extLst>
+          </p:cNvPr>
+          <p:cNvSpPr txBox="1"/>
+          <p:nvPr/>
+        </p:nvSpPr>
+        <p:spPr>
+          <a:xfrm>
+            <a:off x="7753753" y="4564583"/>
+            <a:ext cx="1386600" cy="369332"/>
+          </a:xfrm>
+          <a:prstGeom prst="rect">
+            <a:avLst/>
+          </a:prstGeom>
+          <a:noFill/>
+        </p:spPr>
+        <p:txBody>
+          <a:bodyPr wrap="square" rtlCol="0">
+            <a:spAutoFit/>
+          </a:bodyPr>
+          <a:lstStyle/>
+          <a:p>
+            <a:pPr algn="ctr"/>
+            <a:r>
+              <a:rPr lang="en-US" altLang="zh-TW" b="1" dirty="0"/>
+              <a:t>0.93%</a:t>
+            </a:r>
+            <a:endParaRPr lang="zh-TW" altLang="en-US" b="1" dirty="0"/>
+          </a:p>
+        </p:txBody>
+      </p:sp>
+      <p:sp>
+        <p:nvSpPr>
+          <p:cNvPr id="23" name="TextBox 22">
+            <a:extLst>
+              <a:ext uri="{FF2B5EF4-FFF2-40B4-BE49-F238E27FC236}">
+                <a16:creationId xmlns:a16="http://schemas.microsoft.com/office/drawing/2014/main" id="{782857F9-8C68-D014-6AA7-D588CDF0B58F}"/>
+              </a:ext>
+            </a:extLst>
+          </p:cNvPr>
+          <p:cNvSpPr txBox="1"/>
+          <p:nvPr/>
+        </p:nvSpPr>
+        <p:spPr>
+          <a:xfrm>
+            <a:off x="3948596" y="8362379"/>
+            <a:ext cx="1816083" cy="369332"/>
+          </a:xfrm>
+          <a:prstGeom prst="rect">
+            <a:avLst/>
+          </a:prstGeom>
+          <a:noFill/>
+        </p:spPr>
+        <p:txBody>
+          <a:bodyPr wrap="square" rtlCol="0">
+            <a:spAutoFit/>
+          </a:bodyPr>
+          <a:lstStyle/>
+          <a:p>
+            <a:pPr algn="ctr"/>
+            <a:r>
+              <a:rPr lang="en-US" altLang="zh-TW" b="1" dirty="0"/>
+              <a:t>0.88%</a:t>
+            </a:r>
+            <a:endParaRPr lang="zh-TW" altLang="en-US" b="1" dirty="0"/>
+          </a:p>
+        </p:txBody>
+      </p:sp>
+      <p:sp>
+        <p:nvSpPr>
+          <p:cNvPr id="24" name="TextBox 23">
+            <a:extLst>
+              <a:ext uri="{FF2B5EF4-FFF2-40B4-BE49-F238E27FC236}">
+                <a16:creationId xmlns:a16="http://schemas.microsoft.com/office/drawing/2014/main" id="{510DBBF9-C335-D257-5205-CA508C460652}"/>
+              </a:ext>
+            </a:extLst>
+          </p:cNvPr>
+          <p:cNvSpPr txBox="1"/>
+          <p:nvPr/>
+        </p:nvSpPr>
+        <p:spPr>
+          <a:xfrm>
+            <a:off x="6984190" y="7302960"/>
+            <a:ext cx="2415474" cy="369332"/>
+          </a:xfrm>
+          <a:prstGeom prst="rect">
+            <a:avLst/>
+          </a:prstGeom>
+          <a:noFill/>
+        </p:spPr>
+        <p:txBody>
+          <a:bodyPr wrap="square" rtlCol="0">
+            <a:spAutoFit/>
+          </a:bodyPr>
+          <a:lstStyle/>
+          <a:p>
+            <a:pPr algn="ctr"/>
+            <a:r>
+              <a:rPr lang="en-US" altLang="zh-TW" b="1" dirty="0"/>
+              <a:t>9.92%</a:t>
+            </a:r>
+            <a:endParaRPr lang="zh-TW" altLang="en-US" b="1" dirty="0"/>
+          </a:p>
+        </p:txBody>
+      </p:sp>
+      <p:sp>
+        <p:nvSpPr>
+          <p:cNvPr id="26" name="TextBox 25">
+            <a:extLst>
+              <a:ext uri="{FF2B5EF4-FFF2-40B4-BE49-F238E27FC236}">
+                <a16:creationId xmlns:a16="http://schemas.microsoft.com/office/drawing/2014/main" id="{319446C0-0224-E607-A315-30943AA19B26}"/>
+              </a:ext>
+            </a:extLst>
+          </p:cNvPr>
+          <p:cNvSpPr txBox="1"/>
+          <p:nvPr/>
+        </p:nvSpPr>
+        <p:spPr>
+          <a:xfrm>
+            <a:off x="3451535" y="7447491"/>
+            <a:ext cx="1665767" cy="369332"/>
+          </a:xfrm>
+          <a:prstGeom prst="rect">
+            <a:avLst/>
+          </a:prstGeom>
+          <a:noFill/>
+        </p:spPr>
+        <p:txBody>
+          <a:bodyPr wrap="square" rtlCol="0">
+            <a:spAutoFit/>
+          </a:bodyPr>
+          <a:lstStyle/>
+          <a:p>
+            <a:pPr algn="ctr"/>
+            <a:r>
+              <a:rPr lang="en-US" altLang="zh-TW" b="1" dirty="0"/>
+              <a:t>1.09%</a:t>
+            </a:r>
+            <a:endParaRPr lang="zh-TW" altLang="en-US" b="1" dirty="0"/>
+          </a:p>
+        </p:txBody>
+      </p:sp>
+      <p:sp>
+        <p:nvSpPr>
+          <p:cNvPr id="31" name="TextBox 30">
+            <a:extLst>
+              <a:ext uri="{FF2B5EF4-FFF2-40B4-BE49-F238E27FC236}">
+                <a16:creationId xmlns:a16="http://schemas.microsoft.com/office/drawing/2014/main" id="{09E5C54B-9291-2A1E-F5C5-E157881FF118}"/>
+              </a:ext>
+            </a:extLst>
+          </p:cNvPr>
+          <p:cNvSpPr txBox="1"/>
+          <p:nvPr/>
+        </p:nvSpPr>
+        <p:spPr>
+          <a:xfrm>
+            <a:off x="3948596" y="9165828"/>
+            <a:ext cx="1397741" cy="369332"/>
+          </a:xfrm>
+          <a:prstGeom prst="rect">
+            <a:avLst/>
+          </a:prstGeom>
+          <a:noFill/>
+        </p:spPr>
+        <p:txBody>
+          <a:bodyPr wrap="square" rtlCol="0">
+            <a:spAutoFit/>
+          </a:bodyPr>
+          <a:lstStyle/>
+          <a:p>
+            <a:pPr algn="ctr"/>
+            <a:r>
+              <a:rPr lang="en-US" altLang="zh-TW" b="1" dirty="0"/>
+              <a:t>1.74%</a:t>
+            </a:r>
+            <a:endParaRPr lang="zh-TW" altLang="en-US" b="1" dirty="0"/>
+          </a:p>
+        </p:txBody>
+      </p:sp>
+      <p:sp>
+        <p:nvSpPr>
+          <p:cNvPr id="36" name="TextBox 35">
+            <a:extLst>
+              <a:ext uri="{FF2B5EF4-FFF2-40B4-BE49-F238E27FC236}">
+                <a16:creationId xmlns:a16="http://schemas.microsoft.com/office/drawing/2014/main" id="{CBFCD9F6-EF46-2A38-04B8-F5111D6CA3B4}"/>
+              </a:ext>
+            </a:extLst>
+          </p:cNvPr>
+          <p:cNvSpPr txBox="1"/>
+          <p:nvPr/>
+        </p:nvSpPr>
+        <p:spPr>
+          <a:xfrm>
+            <a:off x="7665039" y="8377675"/>
+            <a:ext cx="1808974" cy="369332"/>
+          </a:xfrm>
+          <a:prstGeom prst="rect">
+            <a:avLst/>
+          </a:prstGeom>
+          <a:noFill/>
+        </p:spPr>
+        <p:txBody>
+          <a:bodyPr wrap="square" rtlCol="0">
+            <a:spAutoFit/>
+          </a:bodyPr>
+          <a:lstStyle/>
+          <a:p>
+            <a:pPr algn="ctr"/>
+            <a:r>
+              <a:rPr lang="en-US" altLang="zh-TW" b="1" dirty="0"/>
+              <a:t>9.17%</a:t>
+            </a:r>
+            <a:endParaRPr lang="zh-TW" altLang="en-US" b="1" dirty="0"/>
+          </a:p>
+        </p:txBody>
+      </p:sp>
+      <p:sp>
+        <p:nvSpPr>
+          <p:cNvPr id="37" name="TextBox 36">
+            <a:extLst>
+              <a:ext uri="{FF2B5EF4-FFF2-40B4-BE49-F238E27FC236}">
+                <a16:creationId xmlns:a16="http://schemas.microsoft.com/office/drawing/2014/main" id="{32748BB7-4BC8-523A-1E17-628BC1534084}"/>
+              </a:ext>
+            </a:extLst>
+          </p:cNvPr>
+          <p:cNvSpPr txBox="1"/>
+          <p:nvPr/>
+        </p:nvSpPr>
+        <p:spPr>
+          <a:xfrm>
+            <a:off x="7665039" y="9158910"/>
+            <a:ext cx="1397739" cy="369332"/>
+          </a:xfrm>
+          <a:prstGeom prst="rect">
+            <a:avLst/>
+          </a:prstGeom>
+          <a:noFill/>
+        </p:spPr>
+        <p:txBody>
+          <a:bodyPr wrap="square" rtlCol="0">
+            <a:spAutoFit/>
+          </a:bodyPr>
+          <a:lstStyle/>
+          <a:p>
+            <a:pPr algn="ctr"/>
+            <a:r>
+              <a:rPr lang="en-US" altLang="zh-TW" b="1" dirty="0"/>
+              <a:t>12.56%</a:t>
+            </a:r>
+            <a:endParaRPr lang="zh-TW" altLang="en-US" b="1" dirty="0"/>
+          </a:p>
+        </p:txBody>
+      </p:sp>
+      <p:sp>
+        <p:nvSpPr>
+          <p:cNvPr id="46" name="TextBox 45">
+            <a:extLst>
+              <a:ext uri="{FF2B5EF4-FFF2-40B4-BE49-F238E27FC236}">
+                <a16:creationId xmlns:a16="http://schemas.microsoft.com/office/drawing/2014/main" id="{0E028D62-BBCF-B0B1-4C65-2C40072A9167}"/>
+              </a:ext>
+            </a:extLst>
+          </p:cNvPr>
+          <p:cNvSpPr txBox="1"/>
+          <p:nvPr/>
+        </p:nvSpPr>
+        <p:spPr>
+          <a:xfrm>
+            <a:off x="3442284" y="6459106"/>
+            <a:ext cx="1871840" cy="369332"/>
+          </a:xfrm>
+          <a:prstGeom prst="rect">
+            <a:avLst/>
+          </a:prstGeom>
+          <a:noFill/>
+        </p:spPr>
+        <p:txBody>
+          <a:bodyPr wrap="square" rtlCol="0">
+            <a:spAutoFit/>
+          </a:bodyPr>
+          <a:lstStyle/>
+          <a:p>
+            <a:pPr algn="ctr"/>
+            <a:r>
+              <a:rPr lang="en-US" altLang="zh-TW" b="1" dirty="0"/>
+              <a:t>0.09%</a:t>
+            </a:r>
+            <a:endParaRPr lang="zh-TW" altLang="en-US" b="1" dirty="0"/>
+          </a:p>
+        </p:txBody>
+      </p:sp>
+      <p:sp>
+        <p:nvSpPr>
+          <p:cNvPr id="53" name="TextBox 52">
+            <a:extLst>
+              <a:ext uri="{FF2B5EF4-FFF2-40B4-BE49-F238E27FC236}">
+                <a16:creationId xmlns:a16="http://schemas.microsoft.com/office/drawing/2014/main" id="{7404AC42-0609-3B69-283F-4F0FB5BF51E4}"/>
+              </a:ext>
+            </a:extLst>
+          </p:cNvPr>
+          <p:cNvSpPr txBox="1"/>
+          <p:nvPr/>
+        </p:nvSpPr>
+        <p:spPr>
+          <a:xfrm>
+            <a:off x="5875485" y="10207462"/>
+            <a:ext cx="4706461" cy="369332"/>
+          </a:xfrm>
+          <a:prstGeom prst="rect">
+            <a:avLst/>
+          </a:prstGeom>
+          <a:noFill/>
+        </p:spPr>
+        <p:txBody>
+          <a:bodyPr wrap="square" rtlCol="0">
+            <a:spAutoFit/>
+          </a:bodyPr>
+          <a:lstStyle/>
+          <a:p>
+            <a:pPr algn="ctr"/>
+            <a:r>
+              <a:rPr lang="zh-TW" altLang="en-US" b="1" dirty="0"/>
+              <a:t>**</a:t>
+            </a:r>
+            <a:r>
+              <a:rPr lang="en-US" altLang="zh-TW" b="1" dirty="0"/>
+              <a:t>:</a:t>
+            </a:r>
+            <a:r>
+              <a:rPr lang="zh-TW" altLang="en-US" b="1" dirty="0"/>
+              <a:t> </a:t>
+            </a:r>
+            <a:r>
+              <a:rPr lang="en-US" altLang="zh-TW" b="1" dirty="0"/>
+              <a:t>only a single research can be identified</a:t>
+            </a:r>
+            <a:endParaRPr lang="zh-TW" altLang="en-US" b="1" dirty="0"/>
+          </a:p>
+        </p:txBody>
+      </p:sp>
+      <p:sp>
+        <p:nvSpPr>
+          <p:cNvPr id="20" name="Rectangle 19">
+            <a:extLst>
+              <a:ext uri="{FF2B5EF4-FFF2-40B4-BE49-F238E27FC236}">
+                <a16:creationId xmlns:a16="http://schemas.microsoft.com/office/drawing/2014/main" id="{7F89C213-90EF-C9A4-4840-AAA8E9FC8DF5}"/>
+              </a:ext>
+            </a:extLst>
+          </p:cNvPr>
+          <p:cNvSpPr/>
+          <p:nvPr/>
+        </p:nvSpPr>
+        <p:spPr>
+          <a:xfrm>
+            <a:off x="3377677" y="110836"/>
+            <a:ext cx="2269881" cy="1018867"/>
+          </a:xfrm>
+          <a:prstGeom prst="rect">
+            <a:avLst/>
+          </a:prstGeom>
+          <a:noFill/>
+          <a:ln w="57150">
+            <a:solidFill>
+              <a:srgbClr val="00B050"/>
+            </a:solidFill>
+          </a:ln>
+        </p:spPr>
+        <p:style>
+          <a:lnRef idx="2">
+            <a:schemeClr val="accent1">
+              <a:shade val="15000"/>
+            </a:schemeClr>
+          </a:lnRef>
+          <a:fillRef idx="1">
+            <a:schemeClr val="accent1"/>
+          </a:fillRef>
+          <a:effectRef idx="0">
+            <a:schemeClr val="accent1"/>
+          </a:effectRef>
+          <a:fontRef idx="minor">
+            <a:schemeClr val="lt1"/>
+          </a:fontRef>
+        </p:style>
+        <p:txBody>
+          <a:bodyPr rtlCol="0" anchor="ctr"/>
+          <a:lstStyle/>
+          <a:p>
+            <a:pPr algn="ctr"/>
+            <a:endParaRPr lang="zh-TW" altLang="en-US"/>
+          </a:p>
+        </p:txBody>
+      </p:sp>
+      <p:sp>
+        <p:nvSpPr>
+          <p:cNvPr id="27" name="Rectangle 26">
+            <a:extLst>
+              <a:ext uri="{FF2B5EF4-FFF2-40B4-BE49-F238E27FC236}">
+                <a16:creationId xmlns:a16="http://schemas.microsoft.com/office/drawing/2014/main" id="{11FBA7D2-6D34-9237-AF1A-CCE8ED9B7393}"/>
+              </a:ext>
+            </a:extLst>
+          </p:cNvPr>
+          <p:cNvSpPr/>
+          <p:nvPr/>
+        </p:nvSpPr>
+        <p:spPr>
+          <a:xfrm>
+            <a:off x="3318260" y="6340357"/>
+            <a:ext cx="2269881" cy="1018867"/>
+          </a:xfrm>
+          <a:prstGeom prst="rect">
+            <a:avLst/>
+          </a:prstGeom>
+          <a:noFill/>
+          <a:ln w="57150">
+            <a:solidFill>
+              <a:srgbClr val="00B050"/>
+            </a:solidFill>
+          </a:ln>
+        </p:spPr>
+        <p:style>
+          <a:lnRef idx="2">
+            <a:schemeClr val="accent1">
+              <a:shade val="15000"/>
+            </a:schemeClr>
+          </a:lnRef>
+          <a:fillRef idx="1">
+            <a:schemeClr val="accent1"/>
+          </a:fillRef>
+          <a:effectRef idx="0">
+            <a:schemeClr val="accent1"/>
+          </a:effectRef>
+          <a:fontRef idx="minor">
+            <a:schemeClr val="lt1"/>
+          </a:fontRef>
+        </p:style>
+        <p:txBody>
+          <a:bodyPr rtlCol="0" anchor="ctr"/>
+          <a:lstStyle/>
+          <a:p>
+            <a:pPr algn="ctr"/>
+            <a:endParaRPr lang="zh-TW" altLang="en-US"/>
+          </a:p>
+        </p:txBody>
+      </p:sp>
+      <p:sp>
+        <p:nvSpPr>
+          <p:cNvPr id="28" name="Rectangle 27">
+            <a:extLst>
+              <a:ext uri="{FF2B5EF4-FFF2-40B4-BE49-F238E27FC236}">
+                <a16:creationId xmlns:a16="http://schemas.microsoft.com/office/drawing/2014/main" id="{89EC26C0-20DA-307B-7BA2-DB1FB25D88BA}"/>
+              </a:ext>
+            </a:extLst>
+          </p:cNvPr>
+          <p:cNvSpPr/>
+          <p:nvPr/>
+        </p:nvSpPr>
+        <p:spPr>
+          <a:xfrm>
+            <a:off x="3410635" y="7439335"/>
+            <a:ext cx="2591575" cy="2580760"/>
+          </a:xfrm>
+          <a:prstGeom prst="rect">
+            <a:avLst/>
+          </a:prstGeom>
+          <a:noFill/>
+          <a:ln w="57150">
+            <a:solidFill>
+              <a:schemeClr val="accent2"/>
+            </a:solidFill>
+          </a:ln>
+        </p:spPr>
+        <p:style>
+          <a:lnRef idx="2">
+            <a:schemeClr val="accent1">
+              <a:shade val="15000"/>
+            </a:schemeClr>
+          </a:lnRef>
+          <a:fillRef idx="1">
+            <a:schemeClr val="accent1"/>
+          </a:fillRef>
+          <a:effectRef idx="0">
+            <a:schemeClr val="accent1"/>
+          </a:effectRef>
+          <a:fontRef idx="minor">
+            <a:schemeClr val="lt1"/>
+          </a:fontRef>
+        </p:style>
+        <p:txBody>
+          <a:bodyPr rtlCol="0" anchor="ctr"/>
+          <a:lstStyle/>
+          <a:p>
+            <a:pPr algn="ctr"/>
+            <a:endParaRPr lang="zh-TW" altLang="en-US"/>
+          </a:p>
+        </p:txBody>
+      </p:sp>
+      <p:sp>
+        <p:nvSpPr>
+          <p:cNvPr id="29" name="Rectangle 28">
+            <a:extLst>
+              <a:ext uri="{FF2B5EF4-FFF2-40B4-BE49-F238E27FC236}">
+                <a16:creationId xmlns:a16="http://schemas.microsoft.com/office/drawing/2014/main" id="{61A06522-421C-FF22-DD37-6519C87A6CFB}"/>
+              </a:ext>
+            </a:extLst>
+          </p:cNvPr>
+          <p:cNvSpPr/>
+          <p:nvPr/>
+        </p:nvSpPr>
+        <p:spPr>
+          <a:xfrm>
+            <a:off x="3400743" y="1264604"/>
+            <a:ext cx="3467825" cy="4807252"/>
+          </a:xfrm>
+          <a:prstGeom prst="rect">
+            <a:avLst/>
+          </a:prstGeom>
+          <a:noFill/>
+          <a:ln w="57150">
+            <a:solidFill>
+              <a:srgbClr val="00B050"/>
+            </a:solidFill>
+          </a:ln>
+        </p:spPr>
+        <p:style>
+          <a:lnRef idx="2">
+            <a:schemeClr val="accent1">
+              <a:shade val="15000"/>
+            </a:schemeClr>
+          </a:lnRef>
+          <a:fillRef idx="1">
+            <a:schemeClr val="accent1"/>
+          </a:fillRef>
+          <a:effectRef idx="0">
+            <a:schemeClr val="accent1"/>
+          </a:effectRef>
+          <a:fontRef idx="minor">
+            <a:schemeClr val="lt1"/>
+          </a:fontRef>
+        </p:style>
+        <p:txBody>
+          <a:bodyPr rtlCol="0" anchor="ctr"/>
+          <a:lstStyle/>
+          <a:p>
+            <a:pPr algn="ctr"/>
+            <a:endParaRPr lang="zh-TW" altLang="en-US"/>
+          </a:p>
+        </p:txBody>
+      </p:sp>
+      <p:sp>
+        <p:nvSpPr>
+          <p:cNvPr id="30" name="Rectangle 29">
+            <a:extLst>
+              <a:ext uri="{FF2B5EF4-FFF2-40B4-BE49-F238E27FC236}">
+                <a16:creationId xmlns:a16="http://schemas.microsoft.com/office/drawing/2014/main" id="{E94A2B4D-0FB3-08DA-583D-A19243B2EB71}"/>
+              </a:ext>
+            </a:extLst>
+          </p:cNvPr>
+          <p:cNvSpPr/>
+          <p:nvPr/>
+        </p:nvSpPr>
+        <p:spPr>
+          <a:xfrm>
+            <a:off x="6994926" y="960427"/>
+            <a:ext cx="3600346" cy="4567301"/>
+          </a:xfrm>
+          <a:prstGeom prst="rect">
+            <a:avLst/>
+          </a:prstGeom>
+          <a:noFill/>
+          <a:ln w="57150">
+            <a:solidFill>
+              <a:schemeClr val="accent2"/>
+            </a:solidFill>
+          </a:ln>
+        </p:spPr>
+        <p:style>
+          <a:lnRef idx="2">
+            <a:schemeClr val="accent1">
+              <a:shade val="15000"/>
+            </a:schemeClr>
+          </a:lnRef>
+          <a:fillRef idx="1">
+            <a:schemeClr val="accent1"/>
+          </a:fillRef>
+          <a:effectRef idx="0">
+            <a:schemeClr val="accent1"/>
+          </a:effectRef>
+          <a:fontRef idx="minor">
+            <a:schemeClr val="lt1"/>
+          </a:fontRef>
+        </p:style>
+        <p:txBody>
+          <a:bodyPr rtlCol="0" anchor="ctr"/>
+          <a:lstStyle/>
+          <a:p>
+            <a:pPr algn="ctr"/>
+            <a:endParaRPr lang="zh-TW" altLang="en-US"/>
+          </a:p>
+        </p:txBody>
+      </p:sp>
+      <p:sp>
+        <p:nvSpPr>
+          <p:cNvPr id="33" name="Rectangle 32">
+            <a:extLst>
+              <a:ext uri="{FF2B5EF4-FFF2-40B4-BE49-F238E27FC236}">
+                <a16:creationId xmlns:a16="http://schemas.microsoft.com/office/drawing/2014/main" id="{3A16DBFB-6345-194C-22C5-CDA3856A9200}"/>
+              </a:ext>
+            </a:extLst>
+          </p:cNvPr>
+          <p:cNvSpPr/>
+          <p:nvPr/>
+        </p:nvSpPr>
+        <p:spPr>
+          <a:xfrm>
+            <a:off x="6783262" y="7236331"/>
+            <a:ext cx="2794845" cy="2741444"/>
+          </a:xfrm>
+          <a:prstGeom prst="rect">
+            <a:avLst/>
+          </a:prstGeom>
+          <a:noFill/>
+          <a:ln w="57150">
+            <a:solidFill>
+              <a:srgbClr val="EE0000"/>
+            </a:solidFill>
+          </a:ln>
+        </p:spPr>
+        <p:style>
+          <a:lnRef idx="2">
+            <a:schemeClr val="accent1">
+              <a:shade val="15000"/>
+            </a:schemeClr>
+          </a:lnRef>
+          <a:fillRef idx="1">
+            <a:schemeClr val="accent1"/>
+          </a:fillRef>
+          <a:effectRef idx="0">
+            <a:schemeClr val="accent1"/>
+          </a:effectRef>
+          <a:fontRef idx="minor">
+            <a:schemeClr val="lt1"/>
+          </a:fontRef>
+        </p:style>
+        <p:txBody>
+          <a:bodyPr rtlCol="0" anchor="ctr"/>
+          <a:lstStyle/>
+          <a:p>
+            <a:pPr algn="ctr"/>
+            <a:endParaRPr lang="zh-TW" altLang="en-US"/>
+          </a:p>
+        </p:txBody>
+      </p:sp>
+    </p:spTree>
+    <p:extLst>
+      <p:ext uri="{BB962C8B-B14F-4D97-AF65-F5344CB8AC3E}">
+        <p14:creationId xmlns:p14="http://schemas.microsoft.com/office/powerpoint/2010/main" val="2475608084"/>
       </p:ext>
     </p:extLst>
   </p:cSld>

</xml_diff>